<commit_message>
updated course intro slides
</commit_message>
<xml_diff>
--- a/ClassMaterials/CourseIntro/CWA-intro.pptx
+++ b/ClassMaterials/CourseIntro/CWA-intro.pptx
@@ -176,7 +176,7 @@
 <file path=ppt/revisionInfo.xml><?xml version="1.0" encoding="utf-8"?>
 <p1510:revInfo xmlns:a="http://schemas.openxmlformats.org/drawingml/2006/main" xmlns:r="http://schemas.openxmlformats.org/officeDocument/2006/relationships" xmlns:p1510="http://schemas.microsoft.com/office/powerpoint/2015/10/main">
   <p1510:revLst>
-    <p1510:client id="{E83998F9-EE91-48FF-A7F2-D5F8DE4E148C}" v="516" dt="2021-09-06T14:23:38.254"/>
+    <p1510:client id="{8D2797B0-A653-4FEA-8E44-08631DCA1382}" v="1" dt="2021-12-02T15:53:13.507"/>
   </p1510:revLst>
 </p1510:revInfo>
 </file>
@@ -479,6 +479,61 @@
       </pc:sldChg>
     </pc:docChg>
   </pc:docChgLst>
+  <pc:docChgLst>
+    <pc:chgData name="Hewner, Mike" userId="7f3f83dd-6dfb-4127-a87f-c1714bd4fac9" providerId="ADAL" clId="{8D2797B0-A653-4FEA-8E44-08631DCA1382}"/>
+    <pc:docChg chg="custSel modSld">
+      <pc:chgData name="Hewner, Mike" userId="7f3f83dd-6dfb-4127-a87f-c1714bd4fac9" providerId="ADAL" clId="{8D2797B0-A653-4FEA-8E44-08631DCA1382}" dt="2021-12-02T15:53:27.130" v="685" actId="114"/>
+      <pc:docMkLst>
+        <pc:docMk/>
+      </pc:docMkLst>
+      <pc:sldChg chg="addSp delSp modSp mod">
+        <pc:chgData name="Hewner, Mike" userId="7f3f83dd-6dfb-4127-a87f-c1714bd4fac9" providerId="ADAL" clId="{8D2797B0-A653-4FEA-8E44-08631DCA1382}" dt="2021-12-02T15:53:27.130" v="685" actId="114"/>
+        <pc:sldMkLst>
+          <pc:docMk/>
+          <pc:sldMk cId="2572670830" sldId="349"/>
+        </pc:sldMkLst>
+        <pc:spChg chg="add mod">
+          <ac:chgData name="Hewner, Mike" userId="7f3f83dd-6dfb-4127-a87f-c1714bd4fac9" providerId="ADAL" clId="{8D2797B0-A653-4FEA-8E44-08631DCA1382}" dt="2021-12-02T15:53:27.130" v="685" actId="114"/>
+          <ac:spMkLst>
+            <pc:docMk/>
+            <pc:sldMk cId="2572670830" sldId="349"/>
+            <ac:spMk id="3" creationId="{EA1760E0-37C4-4DCF-998F-08DDE819F60D}"/>
+          </ac:spMkLst>
+        </pc:spChg>
+        <pc:spChg chg="mod">
+          <ac:chgData name="Hewner, Mike" userId="7f3f83dd-6dfb-4127-a87f-c1714bd4fac9" providerId="ADAL" clId="{8D2797B0-A653-4FEA-8E44-08631DCA1382}" dt="2021-12-02T15:53:07.293" v="648" actId="20577"/>
+          <ac:spMkLst>
+            <pc:docMk/>
+            <pc:sldMk cId="2572670830" sldId="349"/>
+            <ac:spMk id="92163" creationId="{00000000-0000-0000-0000-000000000000}"/>
+          </ac:spMkLst>
+        </pc:spChg>
+        <pc:graphicFrameChg chg="del">
+          <ac:chgData name="Hewner, Mike" userId="7f3f83dd-6dfb-4127-a87f-c1714bd4fac9" providerId="ADAL" clId="{8D2797B0-A653-4FEA-8E44-08631DCA1382}" dt="2021-12-02T15:47:15.119" v="351" actId="478"/>
+          <ac:graphicFrameMkLst>
+            <pc:docMk/>
+            <pc:sldMk cId="2572670830" sldId="349"/>
+            <ac:graphicFrameMk id="2" creationId="{00000000-0000-0000-0000-000000000000}"/>
+          </ac:graphicFrameMkLst>
+        </pc:graphicFrameChg>
+      </pc:sldChg>
+      <pc:sldChg chg="modSp mod">
+        <pc:chgData name="Hewner, Mike" userId="7f3f83dd-6dfb-4127-a87f-c1714bd4fac9" providerId="ADAL" clId="{8D2797B0-A653-4FEA-8E44-08631DCA1382}" dt="2021-12-02T14:08:53.252" v="350" actId="20577"/>
+        <pc:sldMkLst>
+          <pc:docMk/>
+          <pc:sldMk cId="1086811534" sldId="361"/>
+        </pc:sldMkLst>
+        <pc:spChg chg="mod">
+          <ac:chgData name="Hewner, Mike" userId="7f3f83dd-6dfb-4127-a87f-c1714bd4fac9" providerId="ADAL" clId="{8D2797B0-A653-4FEA-8E44-08631DCA1382}" dt="2021-12-02T14:08:53.252" v="350" actId="20577"/>
+          <ac:spMkLst>
+            <pc:docMk/>
+            <pc:sldMk cId="1086811534" sldId="361"/>
+            <ac:spMk id="3" creationId="{1F3C37FA-D5F5-47BE-B323-5B8FDA42CEF1}"/>
+          </ac:spMkLst>
+        </pc:spChg>
+      </pc:sldChg>
+    </pc:docChg>
+  </pc:docChgLst>
 </pc:chgInfo>
 </file>
 
@@ -565,7 +620,7 @@
             <a:fld id="{03077007-3A73-4E7D-991C-75440D09B976}" type="datetimeFigureOut">
               <a:rPr lang="en-US" smtClean="0"/>
               <a:pPr/>
-              <a:t>9/6/2021</a:t>
+              <a:t>12/2/2021</a:t>
             </a:fld>
             <a:endParaRPr lang="en-US"/>
           </a:p>
@@ -732,7 +787,7 @@
             <a:fld id="{0C12807D-967C-46EC-93C3-FE16C931482B}" type="datetimeFigureOut">
               <a:rPr lang="en-US" smtClean="0"/>
               <a:pPr/>
-              <a:t>9/6/2021</a:t>
+              <a:t>12/2/2021</a:t>
             </a:fld>
             <a:endParaRPr lang="en-US"/>
           </a:p>
@@ -19350,7 +19405,7 @@
         <p:spPr>
           <a:xfrm>
             <a:off x="609600" y="1148411"/>
-            <a:ext cx="10972800" cy="4530725"/>
+            <a:ext cx="10972800" cy="4947589"/>
           </a:xfrm>
         </p:spPr>
         <p:txBody>
@@ -19365,40 +19420,55 @@
           <a:p>
             <a:r>
               <a:rPr lang="en-US" dirty="0"/>
-              <a:t>Work on a problem from Assignment 3</a:t>
+              <a:t>Work on:</a:t>
             </a:r>
           </a:p>
           <a:p>
             <a:r>
               <a:rPr lang="en-US" dirty="0"/>
-              <a:t>I suggest #3, but you can pick any problem.</a:t>
-            </a:r>
-          </a:p>
-          <a:p>
+              <a:t>(positives </a:t>
+            </a:r>
+            <a:r>
+              <a:rPr lang="en-US" dirty="0" err="1"/>
+              <a:t>lon</a:t>
+            </a:r>
             <a:r>
               <a:rPr lang="en-US" dirty="0"/>
-              <a:t>If one group member has finished the problem you work on</a:t>
-            </a:r>
-          </a:p>
-          <a:p>
-            <a:pPr lvl="1"/>
+              <a:t>) -&gt; returns a list with only the positive elements</a:t>
+            </a:r>
+          </a:p>
+          <a:p>
             <a:r>
               <a:rPr lang="en-US" dirty="0"/>
-              <a:t>Thar student can act as “coach” while the others write and test the code.</a:t>
-            </a:r>
-          </a:p>
-          <a:p>
+              <a:t>(all-positive? </a:t>
+            </a:r>
+            <a:r>
+              <a:rPr lang="en-US" dirty="0" err="1"/>
+              <a:t>lon</a:t>
+            </a:r>
             <a:r>
               <a:rPr lang="en-US" dirty="0"/>
-              <a:t>If no one in your group has finished A2, feel free to work </a:t>
-            </a:r>
-            <a:r>
-              <a:rPr lang="en-US"/>
-              <a:t>on an </a:t>
-            </a:r>
+              <a:t>) -&gt; returns true every element in a list is positive</a:t>
+            </a:r>
+          </a:p>
+          <a:p>
             <a:r>
               <a:rPr lang="en-US" dirty="0"/>
-              <a:t>A2 problem instead.</a:t>
+              <a:t>Note positive? is a build in predicate</a:t>
+            </a:r>
+          </a:p>
+          <a:p>
+            <a:r>
+              <a:rPr lang="en-US" dirty="0"/>
+              <a:t>If you </a:t>
+            </a:r>
+            <a:r>
+              <a:rPr lang="en-US" dirty="0" err="1"/>
+              <a:t>wanna</a:t>
+            </a:r>
+            <a:r>
+              <a:rPr lang="en-US" dirty="0"/>
+              <a:t> get fancy – can both of these be solved in a tail recursive style? </a:t>
             </a:r>
           </a:p>
         </p:txBody>
@@ -19468,7 +19538,7 @@
         <p:spPr>
           <a:xfrm>
             <a:off x="1981200" y="1600201"/>
-            <a:ext cx="8686800" cy="4530725"/>
+            <a:ext cx="9448800" cy="4530725"/>
           </a:xfrm>
         </p:spPr>
         <p:txBody>
@@ -19477,31 +19547,34 @@
           <a:p>
             <a:r>
               <a:rPr lang="en-US" dirty="0"/>
-              <a:t>You may have heard these:</a:t>
-            </a:r>
-          </a:p>
-          <a:p>
-            <a:pPr lvl="1"/>
+              <a:t>You may have heard that it is impossibly difficult</a:t>
+            </a:r>
+          </a:p>
+          <a:p>
+            <a:pPr marL="457200" lvl="1" indent="0">
+              <a:buNone/>
+            </a:pPr>
+            <a:endParaRPr lang="en-US" dirty="0"/>
+          </a:p>
+          <a:p>
             <a:r>
               <a:rPr lang="en-US" dirty="0"/>
-              <a:t>I like to teach it</a:t>
-            </a:r>
-          </a:p>
-          <a:p>
-            <a:pPr lvl="1"/>
+              <a:t>Median grade is a B (for 230 it’s a B+)</a:t>
+            </a:r>
+          </a:p>
+          <a:p>
             <a:r>
               <a:rPr lang="en-US" dirty="0"/>
-              <a:t>It’s impossibly difficult</a:t>
-            </a:r>
-          </a:p>
-          <a:p>
-            <a:pPr lvl="1"/>
+              <a:t>13% take CSSE304 a second time (this is slightly worse than CSSE230)</a:t>
+            </a:r>
+          </a:p>
+          <a:p>
             <a:endParaRPr lang="en-US" dirty="0"/>
           </a:p>
           <a:p>
             <a:r>
               <a:rPr lang="en-US" dirty="0"/>
-              <a:t>Actual grade distribution spring, 2017</a:t>
+              <a:t>But students do work very hard in this course</a:t>
             </a:r>
           </a:p>
           <a:p>
@@ -19516,330 +19589,41 @@
           </a:p>
         </p:txBody>
       </p:sp>
-      <p:graphicFrame>
-        <p:nvGraphicFramePr>
-          <p:cNvPr id="2" name="Table 1"/>
-          <p:cNvGraphicFramePr>
-            <a:graphicFrameLocks noGrp="1"/>
-          </p:cNvGraphicFramePr>
-          <p:nvPr>
-            <p:extLst>
-              <p:ext uri="{D42A27DB-BD31-4B8C-83A1-F6EECF244321}">
-                <p14:modId xmlns:p14="http://schemas.microsoft.com/office/powerpoint/2010/main" val="3661576721"/>
-              </p:ext>
-            </p:extLst>
-          </p:nvPr>
-        </p:nvGraphicFramePr>
-        <p:xfrm>
-          <a:off x="2286000" y="5090160"/>
-          <a:ext cx="7391400" cy="1158240"/>
-        </p:xfrm>
-        <a:graphic>
-          <a:graphicData uri="http://schemas.openxmlformats.org/drawingml/2006/table">
-            <a:tbl>
-              <a:tblPr firstRow="1" bandRow="1">
-                <a:tableStyleId>{F2DE63D5-997A-4646-A377-4702673A728D}</a:tableStyleId>
-              </a:tblPr>
-              <a:tblGrid>
-                <a:gridCol w="923925">
-                  <a:extLst>
-                    <a:ext uri="{9D8B030D-6E8A-4147-A177-3AD203B41FA5}">
-                      <a16:colId xmlns:a16="http://schemas.microsoft.com/office/drawing/2014/main" val="20000"/>
-                    </a:ext>
-                  </a:extLst>
-                </a:gridCol>
-                <a:gridCol w="923925">
-                  <a:extLst>
-                    <a:ext uri="{9D8B030D-6E8A-4147-A177-3AD203B41FA5}">
-                      <a16:colId xmlns:a16="http://schemas.microsoft.com/office/drawing/2014/main" val="20001"/>
-                    </a:ext>
-                  </a:extLst>
-                </a:gridCol>
-                <a:gridCol w="923925">
-                  <a:extLst>
-                    <a:ext uri="{9D8B030D-6E8A-4147-A177-3AD203B41FA5}">
-                      <a16:colId xmlns:a16="http://schemas.microsoft.com/office/drawing/2014/main" val="20002"/>
-                    </a:ext>
-                  </a:extLst>
-                </a:gridCol>
-                <a:gridCol w="923925">
-                  <a:extLst>
-                    <a:ext uri="{9D8B030D-6E8A-4147-A177-3AD203B41FA5}">
-                      <a16:colId xmlns:a16="http://schemas.microsoft.com/office/drawing/2014/main" val="20003"/>
-                    </a:ext>
-                  </a:extLst>
-                </a:gridCol>
-                <a:gridCol w="923925">
-                  <a:extLst>
-                    <a:ext uri="{9D8B030D-6E8A-4147-A177-3AD203B41FA5}">
-                      <a16:colId xmlns:a16="http://schemas.microsoft.com/office/drawing/2014/main" val="20004"/>
-                    </a:ext>
-                  </a:extLst>
-                </a:gridCol>
-                <a:gridCol w="923925">
-                  <a:extLst>
-                    <a:ext uri="{9D8B030D-6E8A-4147-A177-3AD203B41FA5}">
-                      <a16:colId xmlns:a16="http://schemas.microsoft.com/office/drawing/2014/main" val="20005"/>
-                    </a:ext>
-                  </a:extLst>
-                </a:gridCol>
-                <a:gridCol w="923925">
-                  <a:extLst>
-                    <a:ext uri="{9D8B030D-6E8A-4147-A177-3AD203B41FA5}">
-                      <a16:colId xmlns:a16="http://schemas.microsoft.com/office/drawing/2014/main" val="20006"/>
-                    </a:ext>
-                  </a:extLst>
-                </a:gridCol>
-                <a:gridCol w="923925">
-                  <a:extLst>
-                    <a:ext uri="{9D8B030D-6E8A-4147-A177-3AD203B41FA5}">
-                      <a16:colId xmlns:a16="http://schemas.microsoft.com/office/drawing/2014/main" val="20007"/>
-                    </a:ext>
-                  </a:extLst>
-                </a:gridCol>
-              </a:tblGrid>
-              <a:tr h="571500">
-                <a:tc>
-                  <a:txBody>
-                    <a:bodyPr/>
-                    <a:lstStyle/>
-                    <a:p>
-                      <a:pPr algn="ctr"/>
-                      <a:r>
-                        <a:rPr lang="en-US" sz="3200" dirty="0"/>
-                        <a:t>A</a:t>
-                      </a:r>
-                    </a:p>
-                  </a:txBody>
-                  <a:tcPr/>
-                </a:tc>
-                <a:tc>
-                  <a:txBody>
-                    <a:bodyPr/>
-                    <a:lstStyle/>
-                    <a:p>
-                      <a:pPr algn="ctr"/>
-                      <a:r>
-                        <a:rPr lang="en-US" sz="3200" dirty="0"/>
-                        <a:t>B+</a:t>
-                      </a:r>
-                    </a:p>
-                  </a:txBody>
-                  <a:tcPr/>
-                </a:tc>
-                <a:tc>
-                  <a:txBody>
-                    <a:bodyPr/>
-                    <a:lstStyle/>
-                    <a:p>
-                      <a:pPr algn="ctr"/>
-                      <a:r>
-                        <a:rPr lang="en-US" sz="3200" dirty="0"/>
-                        <a:t>B</a:t>
-                      </a:r>
-                    </a:p>
-                  </a:txBody>
-                  <a:tcPr/>
-                </a:tc>
-                <a:tc>
-                  <a:txBody>
-                    <a:bodyPr/>
-                    <a:lstStyle/>
-                    <a:p>
-                      <a:pPr algn="ctr"/>
-                      <a:r>
-                        <a:rPr lang="en-US" sz="3200" dirty="0"/>
-                        <a:t>C+</a:t>
-                      </a:r>
-                    </a:p>
-                  </a:txBody>
-                  <a:tcPr/>
-                </a:tc>
-                <a:tc>
-                  <a:txBody>
-                    <a:bodyPr/>
-                    <a:lstStyle/>
-                    <a:p>
-                      <a:pPr algn="ctr"/>
-                      <a:r>
-                        <a:rPr lang="en-US" sz="3200" dirty="0"/>
-                        <a:t>C</a:t>
-                      </a:r>
-                    </a:p>
-                  </a:txBody>
-                  <a:tcPr/>
-                </a:tc>
-                <a:tc>
-                  <a:txBody>
-                    <a:bodyPr/>
-                    <a:lstStyle/>
-                    <a:p>
-                      <a:pPr algn="ctr"/>
-                      <a:r>
-                        <a:rPr lang="en-US" sz="3200" dirty="0"/>
-                        <a:t>D+</a:t>
-                      </a:r>
-                    </a:p>
-                  </a:txBody>
-                  <a:tcPr/>
-                </a:tc>
-                <a:tc>
-                  <a:txBody>
-                    <a:bodyPr/>
-                    <a:lstStyle/>
-                    <a:p>
-                      <a:pPr algn="ctr"/>
-                      <a:r>
-                        <a:rPr lang="en-US" sz="3200" dirty="0"/>
-                        <a:t>D</a:t>
-                      </a:r>
-                    </a:p>
-                  </a:txBody>
-                  <a:tcPr/>
-                </a:tc>
-                <a:tc>
-                  <a:txBody>
-                    <a:bodyPr/>
-                    <a:lstStyle/>
-                    <a:p>
-                      <a:pPr algn="ctr"/>
-                      <a:r>
-                        <a:rPr lang="en-US" sz="3200" dirty="0"/>
-                        <a:t>F</a:t>
-                      </a:r>
-                    </a:p>
-                  </a:txBody>
-                  <a:tcPr/>
-                </a:tc>
-                <a:extLst>
-                  <a:ext uri="{0D108BD9-81ED-4DB2-BD59-A6C34878D82A}">
-                    <a16:rowId xmlns:a16="http://schemas.microsoft.com/office/drawing/2014/main" val="10000"/>
-                  </a:ext>
-                </a:extLst>
-              </a:tr>
-              <a:tr h="571500">
-                <a:tc>
-                  <a:txBody>
-                    <a:bodyPr/>
-                    <a:lstStyle/>
-                    <a:p>
-                      <a:pPr algn="ctr"/>
-                      <a:r>
-                        <a:rPr lang="en-US" sz="3200" dirty="0"/>
-                        <a:t>33</a:t>
-                      </a:r>
-                    </a:p>
-                  </a:txBody>
-                  <a:tcPr/>
-                </a:tc>
-                <a:tc>
-                  <a:txBody>
-                    <a:bodyPr/>
-                    <a:lstStyle/>
-                    <a:p>
-                      <a:pPr algn="ctr"/>
-                      <a:r>
-                        <a:rPr lang="en-US" sz="3200" dirty="0"/>
-                        <a:t>9</a:t>
-                      </a:r>
-                    </a:p>
-                  </a:txBody>
-                  <a:tcPr/>
-                </a:tc>
-                <a:tc>
-                  <a:txBody>
-                    <a:bodyPr/>
-                    <a:lstStyle/>
-                    <a:p>
-                      <a:pPr algn="ctr"/>
-                      <a:r>
-                        <a:rPr lang="en-US" sz="3200" dirty="0"/>
-                        <a:t>7</a:t>
-                      </a:r>
-                    </a:p>
-                  </a:txBody>
-                  <a:tcPr/>
-                </a:tc>
-                <a:tc>
-                  <a:txBody>
-                    <a:bodyPr/>
-                    <a:lstStyle/>
-                    <a:p>
-                      <a:pPr algn="ctr"/>
-                      <a:r>
-                        <a:rPr lang="en-US" sz="3200" dirty="0"/>
-                        <a:t>2</a:t>
-                      </a:r>
-                    </a:p>
-                  </a:txBody>
-                  <a:tcPr/>
-                </a:tc>
-                <a:tc>
-                  <a:txBody>
-                    <a:bodyPr/>
-                    <a:lstStyle/>
-                    <a:p>
-                      <a:pPr algn="ctr"/>
-                      <a:r>
-                        <a:rPr lang="en-US" sz="3200" dirty="0"/>
-                        <a:t>8</a:t>
-                      </a:r>
-                    </a:p>
-                  </a:txBody>
-                  <a:tcPr/>
-                </a:tc>
-                <a:tc>
-                  <a:txBody>
-                    <a:bodyPr/>
-                    <a:lstStyle/>
-                    <a:p>
-                      <a:pPr algn="ctr"/>
-                      <a:r>
-                        <a:rPr lang="en-US" sz="3200" dirty="0"/>
-                        <a:t>0</a:t>
-                      </a:r>
-                    </a:p>
-                  </a:txBody>
-                  <a:tcPr/>
-                </a:tc>
-                <a:tc>
-                  <a:txBody>
-                    <a:bodyPr/>
-                    <a:lstStyle/>
-                    <a:p>
-                      <a:pPr algn="ctr"/>
-                      <a:r>
-                        <a:rPr lang="en-US" sz="3200" dirty="0"/>
-                        <a:t>4</a:t>
-                      </a:r>
-                    </a:p>
-                  </a:txBody>
-                  <a:tcPr/>
-                </a:tc>
-                <a:tc>
-                  <a:txBody>
-                    <a:bodyPr/>
-                    <a:lstStyle/>
-                    <a:p>
-                      <a:pPr algn="ctr"/>
-                      <a:r>
-                        <a:rPr lang="en-US" sz="3200" dirty="0"/>
-                        <a:t>2</a:t>
-                      </a:r>
-                    </a:p>
-                  </a:txBody>
-                  <a:tcPr/>
-                </a:tc>
-                <a:extLst>
-                  <a:ext uri="{0D108BD9-81ED-4DB2-BD59-A6C34878D82A}">
-                    <a16:rowId xmlns:a16="http://schemas.microsoft.com/office/drawing/2014/main" val="10001"/>
-                  </a:ext>
-                </a:extLst>
-              </a:tr>
-            </a:tbl>
-          </a:graphicData>
-        </a:graphic>
-      </p:graphicFrame>
+      <p:sp>
+        <p:nvSpPr>
+          <p:cNvPr id="3" name="TextBox 2">
+            <a:extLst>
+              <a:ext uri="{FF2B5EF4-FFF2-40B4-BE49-F238E27FC236}">
+                <a16:creationId xmlns:a16="http://schemas.microsoft.com/office/drawing/2014/main" id="{EA1760E0-37C4-4DCF-998F-08DDE819F60D}"/>
+              </a:ext>
+            </a:extLst>
+          </p:cNvPr>
+          <p:cNvSpPr txBox="1"/>
+          <p:nvPr/>
+        </p:nvSpPr>
+        <p:spPr>
+          <a:xfrm>
+            <a:off x="228600" y="6456011"/>
+            <a:ext cx="4379276" cy="369332"/>
+          </a:xfrm>
+          <a:prstGeom prst="rect">
+            <a:avLst/>
+          </a:prstGeom>
+          <a:noFill/>
+        </p:spPr>
+        <p:txBody>
+          <a:bodyPr wrap="none" rtlCol="0">
+            <a:spAutoFit/>
+          </a:bodyPr>
+          <a:lstStyle/>
+          <a:p>
+            <a:r>
+              <a:rPr lang="en-US" i="1" dirty="0"/>
+              <a:t>Data based on 2021 and prior years</a:t>
+            </a:r>
+          </a:p>
+        </p:txBody>
+      </p:sp>
     </p:spTree>
     <p:extLst>
       <p:ext uri="{BB962C8B-B14F-4D97-AF65-F5344CB8AC3E}">

</xml_diff>

<commit_message>
edited a powerpoint but don't remember why
</commit_message>
<xml_diff>
--- a/ClassMaterials/CourseIntro/CWA-intro.pptx
+++ b/ClassMaterials/CourseIntro/CWA-intro.pptx
@@ -1271,6 +1271,91 @@
     <p:extLst>
       <p:ext uri="{BB962C8B-B14F-4D97-AF65-F5344CB8AC3E}">
         <p14:creationId xmlns:p14="http://schemas.microsoft.com/office/powerpoint/2010/main" val="3896124404"/>
+      </p:ext>
+    </p:extLst>
+  </p:cSld>
+  <p:clrMapOvr>
+    <a:masterClrMapping/>
+  </p:clrMapOvr>
+</p:notes>
+</file>
+
+<file path=ppt/notesSlides/notesSlide11.xml><?xml version="1.0" encoding="utf-8"?>
+<p:notes xmlns:a="http://schemas.openxmlformats.org/drawingml/2006/main" xmlns:r="http://schemas.openxmlformats.org/officeDocument/2006/relationships" xmlns:p="http://schemas.openxmlformats.org/presentationml/2006/main">
+  <p:cSld>
+    <p:spTree>
+      <p:nvGrpSpPr>
+        <p:cNvPr id="1" name=""/>
+        <p:cNvGrpSpPr/>
+        <p:nvPr/>
+      </p:nvGrpSpPr>
+      <p:grpSpPr>
+        <a:xfrm>
+          <a:off x="0" y="0"/>
+          <a:ext cx="0" cy="0"/>
+          <a:chOff x="0" y="0"/>
+          <a:chExt cx="0" cy="0"/>
+        </a:xfrm>
+      </p:grpSpPr>
+      <p:sp>
+        <p:nvSpPr>
+          <p:cNvPr id="2" name="Slide Image Placeholder 1"/>
+          <p:cNvSpPr>
+            <a:spLocks noGrp="1" noRot="1" noChangeAspect="1"/>
+          </p:cNvSpPr>
+          <p:nvPr>
+            <p:ph type="sldImg"/>
+          </p:nvPr>
+        </p:nvSpPr>
+        <p:spPr/>
+      </p:sp>
+      <p:sp>
+        <p:nvSpPr>
+          <p:cNvPr id="3" name="Notes Placeholder 2"/>
+          <p:cNvSpPr>
+            <a:spLocks noGrp="1"/>
+          </p:cNvSpPr>
+          <p:nvPr>
+            <p:ph type="body" idx="1"/>
+          </p:nvPr>
+        </p:nvSpPr>
+        <p:spPr/>
+        <p:txBody>
+          <a:bodyPr/>
+          <a:lstStyle/>
+          <a:p>
+            <a:endParaRPr lang="en-US" dirty="0"/>
+          </a:p>
+        </p:txBody>
+      </p:sp>
+      <p:sp>
+        <p:nvSpPr>
+          <p:cNvPr id="4" name="Slide Number Placeholder 3"/>
+          <p:cNvSpPr>
+            <a:spLocks noGrp="1"/>
+          </p:cNvSpPr>
+          <p:nvPr>
+            <p:ph type="sldNum" sz="quarter" idx="5"/>
+          </p:nvPr>
+        </p:nvSpPr>
+        <p:spPr/>
+        <p:txBody>
+          <a:bodyPr/>
+          <a:lstStyle/>
+          <a:p>
+            <a:fld id="{E772BBEE-0ED0-4AF6-8D22-ECE7454DC3FC}" type="slidenum">
+              <a:rPr lang="en-US" smtClean="0"/>
+              <a:pPr/>
+              <a:t>13</a:t>
+            </a:fld>
+            <a:endParaRPr lang="en-US"/>
+          </a:p>
+        </p:txBody>
+      </p:sp>
+    </p:spTree>
+    <p:extLst>
+      <p:ext uri="{BB962C8B-B14F-4D97-AF65-F5344CB8AC3E}">
+        <p14:creationId xmlns:p14="http://schemas.microsoft.com/office/powerpoint/2010/main" val="2875337889"/>
       </p:ext>
     </p:extLst>
   </p:cSld>

</xml_diff>

<commit_message>
revisions to Course intro
</commit_message>
<xml_diff>
--- a/ClassMaterials/CourseIntro/CWA-intro.pptx
+++ b/ClassMaterials/CourseIntro/CWA-intro.pptx
@@ -171,14 +171,6 @@
     </p:ext>
   </p:extLst>
 </p:presentation>
-</file>
-
-<file path=ppt/revisionInfo.xml><?xml version="1.0" encoding="utf-8"?>
-<p1510:revInfo xmlns:a="http://schemas.openxmlformats.org/drawingml/2006/main" xmlns:r="http://schemas.openxmlformats.org/officeDocument/2006/relationships" xmlns:p1510="http://schemas.microsoft.com/office/powerpoint/2015/10/main">
-  <p1510:revLst>
-    <p1510:client id="{8D2797B0-A653-4FEA-8E44-08631DCA1382}" v="1" dt="2021-12-02T15:53:13.507"/>
-  </p1510:revLst>
-</p1510:revInfo>
 </file>
 
 <file path=ppt/changesInfos/changesInfo1.xml><?xml version="1.0" encoding="utf-8"?>
@@ -534,6 +526,45 @@
       </pc:sldChg>
     </pc:docChg>
   </pc:docChgLst>
+  <pc:docChgLst>
+    <pc:chgData name="Hewner, Mike" userId="7f3f83dd-6dfb-4127-a87f-c1714bd4fac9" providerId="ADAL" clId="{130BB7FF-FCAA-40F6-A4C7-E55C22FB0702}"/>
+    <pc:docChg chg="modSld">
+      <pc:chgData name="Hewner, Mike" userId="7f3f83dd-6dfb-4127-a87f-c1714bd4fac9" providerId="ADAL" clId="{130BB7FF-FCAA-40F6-A4C7-E55C22FB0702}" dt="2022-08-31T15:03:55.508" v="44" actId="20577"/>
+      <pc:docMkLst>
+        <pc:docMk/>
+      </pc:docMkLst>
+      <pc:sldChg chg="modSp mod">
+        <pc:chgData name="Hewner, Mike" userId="7f3f83dd-6dfb-4127-a87f-c1714bd4fac9" providerId="ADAL" clId="{130BB7FF-FCAA-40F6-A4C7-E55C22FB0702}" dt="2022-08-31T15:03:55.508" v="44" actId="20577"/>
+        <pc:sldMkLst>
+          <pc:docMk/>
+          <pc:sldMk cId="2572670830" sldId="349"/>
+        </pc:sldMkLst>
+        <pc:spChg chg="mod">
+          <ac:chgData name="Hewner, Mike" userId="7f3f83dd-6dfb-4127-a87f-c1714bd4fac9" providerId="ADAL" clId="{130BB7FF-FCAA-40F6-A4C7-E55C22FB0702}" dt="2022-08-31T15:03:55.508" v="44" actId="20577"/>
+          <ac:spMkLst>
+            <pc:docMk/>
+            <pc:sldMk cId="2572670830" sldId="349"/>
+            <ac:spMk id="92163" creationId="{00000000-0000-0000-0000-000000000000}"/>
+          </ac:spMkLst>
+        </pc:spChg>
+      </pc:sldChg>
+      <pc:sldChg chg="modSp mod">
+        <pc:chgData name="Hewner, Mike" userId="7f3f83dd-6dfb-4127-a87f-c1714bd4fac9" providerId="ADAL" clId="{130BB7FF-FCAA-40F6-A4C7-E55C22FB0702}" dt="2022-08-31T14:58:10.034" v="23" actId="20577"/>
+        <pc:sldMkLst>
+          <pc:docMk/>
+          <pc:sldMk cId="1086811534" sldId="361"/>
+        </pc:sldMkLst>
+        <pc:spChg chg="mod">
+          <ac:chgData name="Hewner, Mike" userId="7f3f83dd-6dfb-4127-a87f-c1714bd4fac9" providerId="ADAL" clId="{130BB7FF-FCAA-40F6-A4C7-E55C22FB0702}" dt="2022-08-31T14:58:10.034" v="23" actId="20577"/>
+          <ac:spMkLst>
+            <pc:docMk/>
+            <pc:sldMk cId="1086811534" sldId="361"/>
+            <ac:spMk id="3" creationId="{1F3C37FA-D5F5-47BE-B323-5B8FDA42CEF1}"/>
+          </ac:spMkLst>
+        </pc:spChg>
+      </pc:sldChg>
+    </pc:docChg>
+  </pc:docChgLst>
 </pc:chgInfo>
 </file>
 
@@ -620,7 +651,7 @@
             <a:fld id="{03077007-3A73-4E7D-991C-75440D09B976}" type="datetimeFigureOut">
               <a:rPr lang="en-US" smtClean="0"/>
               <a:pPr/>
-              <a:t>12/2/2021</a:t>
+              <a:t>8/31/2022</a:t>
             </a:fld>
             <a:endParaRPr lang="en-US"/>
           </a:p>
@@ -787,7 +818,7 @@
             <a:fld id="{0C12807D-967C-46EC-93C3-FE16C931482B}" type="datetimeFigureOut">
               <a:rPr lang="en-US" smtClean="0"/>
               <a:pPr/>
-              <a:t>12/2/2021</a:t>
+              <a:t>8/31/2022</a:t>
             </a:fld>
             <a:endParaRPr lang="en-US"/>
           </a:p>
@@ -19505,56 +19536,13 @@
           <a:p>
             <a:r>
               <a:rPr lang="en-US" dirty="0"/>
-              <a:t>Work on:</a:t>
-            </a:r>
-          </a:p>
-          <a:p>
-            <a:r>
-              <a:rPr lang="en-US" dirty="0"/>
-              <a:t>(positives </a:t>
+              <a:t>Work on problems in </a:t>
             </a:r>
             <a:r>
               <a:rPr lang="en-US" dirty="0" err="1"/>
-              <a:t>lon</a:t>
-            </a:r>
-            <a:r>
-              <a:rPr lang="en-US" dirty="0"/>
-              <a:t>) -&gt; returns a list with only the positive elements</a:t>
-            </a:r>
-          </a:p>
-          <a:p>
-            <a:r>
-              <a:rPr lang="en-US" dirty="0"/>
-              <a:t>(all-positive? </a:t>
-            </a:r>
-            <a:r>
-              <a:rPr lang="en-US" dirty="0" err="1"/>
-              <a:t>lon</a:t>
-            </a:r>
-            <a:r>
-              <a:rPr lang="en-US" dirty="0"/>
-              <a:t>) -&gt; returns true every element in a list is positive</a:t>
-            </a:r>
-          </a:p>
-          <a:p>
-            <a:r>
-              <a:rPr lang="en-US" dirty="0"/>
-              <a:t>Note positive? is a build in predicate</a:t>
-            </a:r>
-          </a:p>
-          <a:p>
-            <a:r>
-              <a:rPr lang="en-US" dirty="0"/>
-              <a:t>If you </a:t>
-            </a:r>
-            <a:r>
-              <a:rPr lang="en-US" dirty="0" err="1"/>
-              <a:t>wanna</a:t>
-            </a:r>
-            <a:r>
-              <a:rPr lang="en-US" dirty="0"/>
-              <a:t> get fancy – can both of these be solved in a tail recursive style? </a:t>
-            </a:r>
+              <a:t>inclass.rkt</a:t>
+            </a:r>
+            <a:endParaRPr lang="en-US" dirty="0"/>
           </a:p>
         </p:txBody>
       </p:sp>
@@ -19644,17 +19632,8 @@
           <a:p>
             <a:r>
               <a:rPr lang="en-US" dirty="0"/>
-              <a:t>Median grade is a B (for 230 it’s a B+)</a:t>
-            </a:r>
-          </a:p>
-          <a:p>
-            <a:r>
-              <a:rPr lang="en-US" dirty="0"/>
-              <a:t>13% take CSSE304 a second time (this is slightly worse than CSSE230)</a:t>
-            </a:r>
-          </a:p>
-          <a:p>
-            <a:endParaRPr lang="en-US" dirty="0"/>
+              <a:t>Median grade was a B in 2022</a:t>
+            </a:r>
           </a:p>
           <a:p>
             <a:r>

</xml_diff>

<commit_message>
class slides and fixing missing video
</commit_message>
<xml_diff>
--- a/ClassMaterials/CourseIntro/CWA-intro.pptx
+++ b/ClassMaterials/CourseIntro/CWA-intro.pptx
@@ -5,10 +5,10 @@
     <p:sldMasterId id="2147483685" r:id="rId1"/>
   </p:sldMasterIdLst>
   <p:notesMasterIdLst>
-    <p:notesMasterId r:id="rId17"/>
+    <p:notesMasterId r:id="rId16"/>
   </p:notesMasterIdLst>
   <p:handoutMasterIdLst>
-    <p:handoutMasterId r:id="rId18"/>
+    <p:handoutMasterId r:id="rId17"/>
   </p:handoutMasterIdLst>
   <p:sldIdLst>
     <p:sldId id="256" r:id="rId2"/>
@@ -17,15 +17,14 @@
     <p:sldId id="300" r:id="rId5"/>
     <p:sldId id="301" r:id="rId6"/>
     <p:sldId id="302" r:id="rId7"/>
-    <p:sldId id="306" r:id="rId8"/>
-    <p:sldId id="309" r:id="rId9"/>
-    <p:sldId id="311" r:id="rId10"/>
-    <p:sldId id="316" r:id="rId11"/>
-    <p:sldId id="317" r:id="rId12"/>
-    <p:sldId id="357" r:id="rId13"/>
-    <p:sldId id="355" r:id="rId14"/>
-    <p:sldId id="354" r:id="rId15"/>
-    <p:sldId id="361" r:id="rId16"/>
+    <p:sldId id="309" r:id="rId8"/>
+    <p:sldId id="311" r:id="rId9"/>
+    <p:sldId id="316" r:id="rId10"/>
+    <p:sldId id="317" r:id="rId11"/>
+    <p:sldId id="357" r:id="rId12"/>
+    <p:sldId id="355" r:id="rId13"/>
+    <p:sldId id="354" r:id="rId14"/>
+    <p:sldId id="361" r:id="rId15"/>
   </p:sldIdLst>
   <p:sldSz cx="12192000" cy="6858000"/>
   <p:notesSz cx="7315200" cy="9601200"/>
@@ -528,11 +527,40 @@
   </pc:docChgLst>
   <pc:docChgLst>
     <pc:chgData name="Hewner, Mike" userId="7f3f83dd-6dfb-4127-a87f-c1714bd4fac9" providerId="ADAL" clId="{130BB7FF-FCAA-40F6-A4C7-E55C22FB0702}"/>
-    <pc:docChg chg="modSld">
-      <pc:chgData name="Hewner, Mike" userId="7f3f83dd-6dfb-4127-a87f-c1714bd4fac9" providerId="ADAL" clId="{130BB7FF-FCAA-40F6-A4C7-E55C22FB0702}" dt="2022-08-31T15:03:55.508" v="44" actId="20577"/>
+    <pc:docChg chg="custSel delSld modSld">
+      <pc:chgData name="Hewner, Mike" userId="7f3f83dd-6dfb-4127-a87f-c1714bd4fac9" providerId="ADAL" clId="{130BB7FF-FCAA-40F6-A4C7-E55C22FB0702}" dt="2022-09-05T12:46:59.309" v="470" actId="6549"/>
       <pc:docMkLst>
         <pc:docMk/>
       </pc:docMkLst>
+      <pc:sldChg chg="del">
+        <pc:chgData name="Hewner, Mike" userId="7f3f83dd-6dfb-4127-a87f-c1714bd4fac9" providerId="ADAL" clId="{130BB7FF-FCAA-40F6-A4C7-E55C22FB0702}" dt="2022-09-05T12:38:50.086" v="45" actId="47"/>
+        <pc:sldMkLst>
+          <pc:docMk/>
+          <pc:sldMk cId="0" sldId="306"/>
+        </pc:sldMkLst>
+      </pc:sldChg>
+      <pc:sldChg chg="modSp mod">
+        <pc:chgData name="Hewner, Mike" userId="7f3f83dd-6dfb-4127-a87f-c1714bd4fac9" providerId="ADAL" clId="{130BB7FF-FCAA-40F6-A4C7-E55C22FB0702}" dt="2022-09-05T12:46:59.309" v="470" actId="6549"/>
+        <pc:sldMkLst>
+          <pc:docMk/>
+          <pc:sldMk cId="0" sldId="316"/>
+        </pc:sldMkLst>
+        <pc:spChg chg="mod">
+          <ac:chgData name="Hewner, Mike" userId="7f3f83dd-6dfb-4127-a87f-c1714bd4fac9" providerId="ADAL" clId="{130BB7FF-FCAA-40F6-A4C7-E55C22FB0702}" dt="2022-09-05T12:46:59.309" v="470" actId="6549"/>
+          <ac:spMkLst>
+            <pc:docMk/>
+            <pc:sldMk cId="0" sldId="316"/>
+            <ac:spMk id="327682" creationId="{00000000-0000-0000-0000-000000000000}"/>
+          </ac:spMkLst>
+        </pc:spChg>
+      </pc:sldChg>
+      <pc:sldChg chg="modNotesTx">
+        <pc:chgData name="Hewner, Mike" userId="7f3f83dd-6dfb-4127-a87f-c1714bd4fac9" providerId="ADAL" clId="{130BB7FF-FCAA-40F6-A4C7-E55C22FB0702}" dt="2022-09-05T12:46:36.480" v="469" actId="20577"/>
+        <pc:sldMkLst>
+          <pc:docMk/>
+          <pc:sldMk cId="0" sldId="317"/>
+        </pc:sldMkLst>
+      </pc:sldChg>
       <pc:sldChg chg="modSp mod">
         <pc:chgData name="Hewner, Mike" userId="7f3f83dd-6dfb-4127-a87f-c1714bd4fac9" providerId="ADAL" clId="{130BB7FF-FCAA-40F6-A4C7-E55C22FB0702}" dt="2022-08-31T15:03:55.508" v="44" actId="20577"/>
         <pc:sldMkLst>
@@ -547,6 +575,52 @@
             <ac:spMk id="92163" creationId="{00000000-0000-0000-0000-000000000000}"/>
           </ac:spMkLst>
         </pc:spChg>
+      </pc:sldChg>
+      <pc:sldChg chg="modSp mod">
+        <pc:chgData name="Hewner, Mike" userId="7f3f83dd-6dfb-4127-a87f-c1714bd4fac9" providerId="ADAL" clId="{130BB7FF-FCAA-40F6-A4C7-E55C22FB0702}" dt="2022-09-05T12:43:46.151" v="368" actId="1076"/>
+        <pc:sldMkLst>
+          <pc:docMk/>
+          <pc:sldMk cId="675546999" sldId="355"/>
+        </pc:sldMkLst>
+        <pc:spChg chg="mod">
+          <ac:chgData name="Hewner, Mike" userId="7f3f83dd-6dfb-4127-a87f-c1714bd4fac9" providerId="ADAL" clId="{130BB7FF-FCAA-40F6-A4C7-E55C22FB0702}" dt="2022-09-05T12:43:46.151" v="368" actId="1076"/>
+          <ac:spMkLst>
+            <pc:docMk/>
+            <pc:sldMk cId="675546999" sldId="355"/>
+            <ac:spMk id="4" creationId="{B4E4E3C1-BD3D-46FA-AC0B-FC85957DAE2B}"/>
+          </ac:spMkLst>
+        </pc:spChg>
+      </pc:sldChg>
+      <pc:sldChg chg="delSp modSp mod">
+        <pc:chgData name="Hewner, Mike" userId="7f3f83dd-6dfb-4127-a87f-c1714bd4fac9" providerId="ADAL" clId="{130BB7FF-FCAA-40F6-A4C7-E55C22FB0702}" dt="2022-09-05T12:42:43.383" v="275" actId="14100"/>
+        <pc:sldMkLst>
+          <pc:docMk/>
+          <pc:sldMk cId="110241636" sldId="357"/>
+        </pc:sldMkLst>
+        <pc:spChg chg="mod">
+          <ac:chgData name="Hewner, Mike" userId="7f3f83dd-6dfb-4127-a87f-c1714bd4fac9" providerId="ADAL" clId="{130BB7FF-FCAA-40F6-A4C7-E55C22FB0702}" dt="2022-09-05T12:42:43.383" v="275" actId="14100"/>
+          <ac:spMkLst>
+            <pc:docMk/>
+            <pc:sldMk cId="110241636" sldId="357"/>
+            <ac:spMk id="3" creationId="{A30A752C-E206-4321-9433-5E8E2101F744}"/>
+          </ac:spMkLst>
+        </pc:spChg>
+        <pc:picChg chg="del">
+          <ac:chgData name="Hewner, Mike" userId="7f3f83dd-6dfb-4127-a87f-c1714bd4fac9" providerId="ADAL" clId="{130BB7FF-FCAA-40F6-A4C7-E55C22FB0702}" dt="2022-09-05T12:40:58.565" v="46" actId="478"/>
+          <ac:picMkLst>
+            <pc:docMk/>
+            <pc:sldMk cId="110241636" sldId="357"/>
+            <ac:picMk id="5" creationId="{86A2EA81-3FB2-41AC-8F67-07AC857FB3AB}"/>
+          </ac:picMkLst>
+        </pc:picChg>
+        <pc:picChg chg="del">
+          <ac:chgData name="Hewner, Mike" userId="7f3f83dd-6dfb-4127-a87f-c1714bd4fac9" providerId="ADAL" clId="{130BB7FF-FCAA-40F6-A4C7-E55C22FB0702}" dt="2022-09-05T12:41:01.553" v="47" actId="478"/>
+          <ac:picMkLst>
+            <pc:docMk/>
+            <pc:sldMk cId="110241636" sldId="357"/>
+            <ac:picMk id="6" creationId="{FA45F0C0-A81E-4BD7-BE35-F039DB6FA031}"/>
+          </ac:picMkLst>
+        </pc:picChg>
       </pc:sldChg>
       <pc:sldChg chg="modSp mod">
         <pc:chgData name="Hewner, Mike" userId="7f3f83dd-6dfb-4127-a87f-c1714bd4fac9" providerId="ADAL" clId="{130BB7FF-FCAA-40F6-A4C7-E55C22FB0702}" dt="2022-08-31T14:58:10.034" v="23" actId="20577"/>
@@ -651,7 +725,7 @@
             <a:fld id="{03077007-3A73-4E7D-991C-75440D09B976}" type="datetimeFigureOut">
               <a:rPr lang="en-US" smtClean="0"/>
               <a:pPr/>
-              <a:t>8/31/2022</a:t>
+              <a:t>9/5/2022</a:t>
             </a:fld>
             <a:endParaRPr lang="en-US"/>
           </a:p>
@@ -818,7 +892,7 @@
             <a:fld id="{0C12807D-967C-46EC-93C3-FE16C931482B}" type="datetimeFigureOut">
               <a:rPr lang="en-US" smtClean="0"/>
               <a:pPr/>
-              <a:t>8/31/2022</a:t>
+              <a:t>9/5/2022</a:t>
             </a:fld>
             <a:endParaRPr lang="en-US"/>
           </a:p>
@@ -1207,137 +1281,6 @@
             <p:ph type="sldImg"/>
           </p:nvPr>
         </p:nvSpPr>
-        <p:spPr>
-          <a:xfrm>
-            <a:off x="458788" y="720725"/>
-            <a:ext cx="6399212" cy="3600450"/>
-          </a:xfrm>
-        </p:spPr>
-      </p:sp>
-      <p:sp>
-        <p:nvSpPr>
-          <p:cNvPr id="3" name="Notes Placeholder 2"/>
-          <p:cNvSpPr>
-            <a:spLocks noGrp="1"/>
-          </p:cNvSpPr>
-          <p:nvPr>
-            <p:ph type="body" idx="1"/>
-          </p:nvPr>
-        </p:nvSpPr>
-        <p:spPr/>
-        <p:txBody>
-          <a:bodyPr>
-            <a:normAutofit/>
-          </a:bodyPr>
-          <a:lstStyle/>
-          <a:p>
-            <a:r>
-              <a:rPr lang="en-US" dirty="0"/>
-              <a:t>One thing lambda says is </a:t>
-            </a:r>
-          </a:p>
-          <a:p>
-            <a:r>
-              <a:rPr lang="en-US" dirty="0"/>
-              <a:t>"remember and parameterize this code, but don't execute it now."</a:t>
-            </a:r>
-          </a:p>
-          <a:p>
-            <a:r>
-              <a:rPr lang="en-US" dirty="0"/>
-              <a:t>Evaluation</a:t>
-            </a:r>
-            <a:r>
-              <a:rPr lang="en-US" baseline="0" dirty="0"/>
-              <a:t> a lambda expression NEVER causes its body to be evaluated.</a:t>
-            </a:r>
-          </a:p>
-          <a:p>
-            <a:endParaRPr lang="en-US" baseline="0" dirty="0"/>
-          </a:p>
-          <a:p>
-            <a:r>
-              <a:rPr lang="en-US" baseline="0" dirty="0"/>
-              <a:t>Ask students about the order of evaluation …in scheme, java</a:t>
-            </a:r>
-          </a:p>
-          <a:p>
-            <a:r>
-              <a:rPr lang="en-US" baseline="0" dirty="0" err="1"/>
-              <a:t>Mwntiob</a:t>
-            </a:r>
-            <a:r>
-              <a:rPr lang="en-US" baseline="0" dirty="0"/>
-              <a:t> that this is the kind of question that you may not have been asking before that I want you to learn to ask.</a:t>
-            </a:r>
-            <a:endParaRPr lang="en-US" dirty="0"/>
-          </a:p>
-        </p:txBody>
-      </p:sp>
-      <p:sp>
-        <p:nvSpPr>
-          <p:cNvPr id="4" name="Slide Number Placeholder 3"/>
-          <p:cNvSpPr>
-            <a:spLocks noGrp="1"/>
-          </p:cNvSpPr>
-          <p:nvPr>
-            <p:ph type="sldNum" sz="quarter" idx="10"/>
-          </p:nvPr>
-        </p:nvSpPr>
-        <p:spPr/>
-        <p:txBody>
-          <a:bodyPr/>
-          <a:lstStyle/>
-          <a:p>
-            <a:fld id="{E772BBEE-0ED0-4AF6-8D22-ECE7454DC3FC}" type="slidenum">
-              <a:rPr lang="en-US" smtClean="0"/>
-              <a:pPr/>
-              <a:t>11</a:t>
-            </a:fld>
-            <a:endParaRPr lang="en-US"/>
-          </a:p>
-        </p:txBody>
-      </p:sp>
-    </p:spTree>
-    <p:extLst>
-      <p:ext uri="{BB962C8B-B14F-4D97-AF65-F5344CB8AC3E}">
-        <p14:creationId xmlns:p14="http://schemas.microsoft.com/office/powerpoint/2010/main" val="3896124404"/>
-      </p:ext>
-    </p:extLst>
-  </p:cSld>
-  <p:clrMapOvr>
-    <a:masterClrMapping/>
-  </p:clrMapOvr>
-</p:notes>
-</file>
-
-<file path=ppt/notesSlides/notesSlide11.xml><?xml version="1.0" encoding="utf-8"?>
-<p:notes xmlns:a="http://schemas.openxmlformats.org/drawingml/2006/main" xmlns:r="http://schemas.openxmlformats.org/officeDocument/2006/relationships" xmlns:p="http://schemas.openxmlformats.org/presentationml/2006/main">
-  <p:cSld>
-    <p:spTree>
-      <p:nvGrpSpPr>
-        <p:cNvPr id="1" name=""/>
-        <p:cNvGrpSpPr/>
-        <p:nvPr/>
-      </p:nvGrpSpPr>
-      <p:grpSpPr>
-        <a:xfrm>
-          <a:off x="0" y="0"/>
-          <a:ext cx="0" cy="0"/>
-          <a:chOff x="0" y="0"/>
-          <a:chExt cx="0" cy="0"/>
-        </a:xfrm>
-      </p:grpSpPr>
-      <p:sp>
-        <p:nvSpPr>
-          <p:cNvPr id="2" name="Slide Image Placeholder 1"/>
-          <p:cNvSpPr>
-            <a:spLocks noGrp="1" noRot="1" noChangeAspect="1"/>
-          </p:cNvSpPr>
-          <p:nvPr>
-            <p:ph type="sldImg"/>
-          </p:nvPr>
-        </p:nvSpPr>
         <p:spPr/>
       </p:sp>
       <p:sp>
@@ -1377,7 +1320,7 @@
             <a:fld id="{E772BBEE-0ED0-4AF6-8D22-ECE7454DC3FC}" type="slidenum">
               <a:rPr lang="en-US" smtClean="0"/>
               <a:pPr/>
-              <a:t>13</a:t>
+              <a:t>12</a:t>
             </a:fld>
             <a:endParaRPr lang="en-US"/>
           </a:p>
@@ -1906,9 +1849,35 @@
       </p:grpSpPr>
       <p:sp>
         <p:nvSpPr>
-          <p:cNvPr id="2" name="Slide Image Placeholder 1"/>
+          <p:cNvPr id="7" name="Rectangle 7"/>
           <p:cNvSpPr>
-            <a:spLocks noGrp="1" noRot="1" noChangeAspect="1"/>
+            <a:spLocks noGrp="1" noChangeArrowheads="1"/>
+          </p:cNvSpPr>
+          <p:nvPr>
+            <p:ph type="sldNum" sz="quarter" idx="5"/>
+          </p:nvPr>
+        </p:nvSpPr>
+        <p:spPr>
+          <a:ln/>
+        </p:spPr>
+        <p:txBody>
+          <a:bodyPr/>
+          <a:lstStyle/>
+          <a:p>
+            <a:fld id="{601876DE-2652-4617-A420-3AC1026B6CB8}" type="slidenum">
+              <a:rPr lang="en-US"/>
+              <a:pPr/>
+              <a:t>7</a:t>
+            </a:fld>
+            <a:endParaRPr lang="en-US"/>
+          </a:p>
+        </p:txBody>
+      </p:sp>
+      <p:sp>
+        <p:nvSpPr>
+          <p:cNvPr id="342018" name="Rectangle 2"/>
+          <p:cNvSpPr>
+            <a:spLocks noGrp="1" noRot="1" noChangeAspect="1" noChangeArrowheads="1" noTextEdit="1"/>
           </p:cNvSpPr>
           <p:nvPr>
             <p:ph type="sldImg"/>
@@ -1919,13 +1888,14 @@
             <a:off x="458788" y="720725"/>
             <a:ext cx="6399212" cy="3600450"/>
           </a:xfrm>
+          <a:ln/>
         </p:spPr>
       </p:sp>
       <p:sp>
         <p:nvSpPr>
-          <p:cNvPr id="3" name="Notes Placeholder 2"/>
+          <p:cNvPr id="342019" name="Rectangle 3"/>
           <p:cNvSpPr>
-            <a:spLocks noGrp="1"/>
+            <a:spLocks noGrp="1" noChangeArrowheads="1"/>
           </p:cNvSpPr>
           <p:nvPr>
             <p:ph type="body" idx="1"/>
@@ -1938,48 +1908,37 @@
           <a:p>
             <a:r>
               <a:rPr lang="en-US" dirty="0"/>
-              <a:t>I am not "selling scheme"  I am not saying it is the best language.  I do believe it’s the best language for this course.</a:t>
+              <a:t>You'll probably need to read some parts of EoPL multiple times before you'll “get it”.</a:t>
+            </a:r>
+          </a:p>
+          <a:p>
+            <a:pPr lvl="1"/>
+            <a:r>
+              <a:rPr lang="en-US" dirty="0"/>
+              <a:t>Not because the book isn’t good, but because some of the ideas are deep.</a:t>
+            </a:r>
+          </a:p>
+          <a:p>
+            <a:r>
+              <a:rPr lang="en-US" dirty="0"/>
+              <a:t>Perhaps you will need a few days between readings.</a:t>
+            </a:r>
+          </a:p>
+          <a:p>
+            <a:r>
+              <a:rPr lang="en-US" dirty="0"/>
+              <a:t>I will often assign readings a few days before we discuss things so that you have an opportunity to read it a second time if necessary.</a:t>
             </a:r>
           </a:p>
           <a:p>
             <a:endParaRPr lang="en-US" dirty="0"/>
-          </a:p>
-          <a:p>
-            <a:r>
-              <a:rPr lang="en-US" dirty="0"/>
-              <a:t>To me, “does scheme get used a lot”? Is a peripheral question for this course.</a:t>
-            </a:r>
-          </a:p>
-        </p:txBody>
-      </p:sp>
-      <p:sp>
-        <p:nvSpPr>
-          <p:cNvPr id="4" name="Slide Number Placeholder 3"/>
-          <p:cNvSpPr>
-            <a:spLocks noGrp="1"/>
-          </p:cNvSpPr>
-          <p:nvPr>
-            <p:ph type="sldNum" sz="quarter" idx="10"/>
-          </p:nvPr>
-        </p:nvSpPr>
-        <p:spPr/>
-        <p:txBody>
-          <a:bodyPr/>
-          <a:lstStyle/>
-          <a:p>
-            <a:fld id="{E772BBEE-0ED0-4AF6-8D22-ECE7454DC3FC}" type="slidenum">
-              <a:rPr lang="en-US" smtClean="0"/>
-              <a:pPr/>
-              <a:t>7</a:t>
-            </a:fld>
-            <a:endParaRPr lang="en-US"/>
           </a:p>
         </p:txBody>
       </p:sp>
     </p:spTree>
     <p:extLst>
       <p:ext uri="{BB962C8B-B14F-4D97-AF65-F5344CB8AC3E}">
-        <p14:creationId xmlns:p14="http://schemas.microsoft.com/office/powerpoint/2010/main" val="1299210343"/>
+        <p14:creationId xmlns:p14="http://schemas.microsoft.com/office/powerpoint/2010/main" val="2993839965"/>
       </p:ext>
     </p:extLst>
   </p:cSld>
@@ -2023,128 +1982,10 @@
           <a:bodyPr/>
           <a:lstStyle/>
           <a:p>
-            <a:fld id="{601876DE-2652-4617-A420-3AC1026B6CB8}" type="slidenum">
+            <a:fld id="{82177E80-E0DD-45FE-9DCA-4CF6592B778E}" type="slidenum">
               <a:rPr lang="en-US"/>
               <a:pPr/>
               <a:t>8</a:t>
-            </a:fld>
-            <a:endParaRPr lang="en-US"/>
-          </a:p>
-        </p:txBody>
-      </p:sp>
-      <p:sp>
-        <p:nvSpPr>
-          <p:cNvPr id="342018" name="Rectangle 2"/>
-          <p:cNvSpPr>
-            <a:spLocks noGrp="1" noRot="1" noChangeAspect="1" noChangeArrowheads="1" noTextEdit="1"/>
-          </p:cNvSpPr>
-          <p:nvPr>
-            <p:ph type="sldImg"/>
-          </p:nvPr>
-        </p:nvSpPr>
-        <p:spPr>
-          <a:xfrm>
-            <a:off x="458788" y="720725"/>
-            <a:ext cx="6399212" cy="3600450"/>
-          </a:xfrm>
-          <a:ln/>
-        </p:spPr>
-      </p:sp>
-      <p:sp>
-        <p:nvSpPr>
-          <p:cNvPr id="342019" name="Rectangle 3"/>
-          <p:cNvSpPr>
-            <a:spLocks noGrp="1" noChangeArrowheads="1"/>
-          </p:cNvSpPr>
-          <p:nvPr>
-            <p:ph type="body" idx="1"/>
-          </p:nvPr>
-        </p:nvSpPr>
-        <p:spPr/>
-        <p:txBody>
-          <a:bodyPr/>
-          <a:lstStyle/>
-          <a:p>
-            <a:r>
-              <a:rPr lang="en-US" dirty="0"/>
-              <a:t>You'll probably need to read some parts of EoPL multiple times before you'll “get it”.</a:t>
-            </a:r>
-          </a:p>
-          <a:p>
-            <a:pPr lvl="1"/>
-            <a:r>
-              <a:rPr lang="en-US" dirty="0"/>
-              <a:t>Not because the book isn’t good, but because some of the ideas are deep.</a:t>
-            </a:r>
-          </a:p>
-          <a:p>
-            <a:r>
-              <a:rPr lang="en-US" dirty="0"/>
-              <a:t>Perhaps you will need a few days between readings.</a:t>
-            </a:r>
-          </a:p>
-          <a:p>
-            <a:r>
-              <a:rPr lang="en-US" dirty="0"/>
-              <a:t>I will often assign readings a few days before we discuss things so that you have an opportunity to read it a second time if necessary.</a:t>
-            </a:r>
-          </a:p>
-          <a:p>
-            <a:endParaRPr lang="en-US" dirty="0"/>
-          </a:p>
-        </p:txBody>
-      </p:sp>
-    </p:spTree>
-    <p:extLst>
-      <p:ext uri="{BB962C8B-B14F-4D97-AF65-F5344CB8AC3E}">
-        <p14:creationId xmlns:p14="http://schemas.microsoft.com/office/powerpoint/2010/main" val="2993839965"/>
-      </p:ext>
-    </p:extLst>
-  </p:cSld>
-  <p:clrMapOvr>
-    <a:masterClrMapping/>
-  </p:clrMapOvr>
-</p:notes>
-</file>
-
-<file path=ppt/notesSlides/notesSlide8.xml><?xml version="1.0" encoding="utf-8"?>
-<p:notes xmlns:a="http://schemas.openxmlformats.org/drawingml/2006/main" xmlns:r="http://schemas.openxmlformats.org/officeDocument/2006/relationships" xmlns:p="http://schemas.openxmlformats.org/presentationml/2006/main">
-  <p:cSld>
-    <p:spTree>
-      <p:nvGrpSpPr>
-        <p:cNvPr id="1" name=""/>
-        <p:cNvGrpSpPr/>
-        <p:nvPr/>
-      </p:nvGrpSpPr>
-      <p:grpSpPr>
-        <a:xfrm>
-          <a:off x="0" y="0"/>
-          <a:ext cx="0" cy="0"/>
-          <a:chOff x="0" y="0"/>
-          <a:chExt cx="0" cy="0"/>
-        </a:xfrm>
-      </p:grpSpPr>
-      <p:sp>
-        <p:nvSpPr>
-          <p:cNvPr id="7" name="Rectangle 7"/>
-          <p:cNvSpPr>
-            <a:spLocks noGrp="1" noChangeArrowheads="1"/>
-          </p:cNvSpPr>
-          <p:nvPr>
-            <p:ph type="sldNum" sz="quarter" idx="5"/>
-          </p:nvPr>
-        </p:nvSpPr>
-        <p:spPr>
-          <a:ln/>
-        </p:spPr>
-        <p:txBody>
-          <a:bodyPr/>
-          <a:lstStyle/>
-          <a:p>
-            <a:fld id="{82177E80-E0DD-45FE-9DCA-4CF6592B778E}" type="slidenum">
-              <a:rPr lang="en-US"/>
-              <a:pPr/>
-              <a:t>9</a:t>
             </a:fld>
             <a:endParaRPr lang="en-US"/>
           </a:p>
@@ -2191,6 +2032,96 @@
     <p:extLst>
       <p:ext uri="{BB962C8B-B14F-4D97-AF65-F5344CB8AC3E}">
         <p14:creationId xmlns:p14="http://schemas.microsoft.com/office/powerpoint/2010/main" val="1773937958"/>
+      </p:ext>
+    </p:extLst>
+  </p:cSld>
+  <p:clrMapOvr>
+    <a:masterClrMapping/>
+  </p:clrMapOvr>
+</p:notes>
+</file>
+
+<file path=ppt/notesSlides/notesSlide8.xml><?xml version="1.0" encoding="utf-8"?>
+<p:notes xmlns:a="http://schemas.openxmlformats.org/drawingml/2006/main" xmlns:r="http://schemas.openxmlformats.org/officeDocument/2006/relationships" xmlns:p="http://schemas.openxmlformats.org/presentationml/2006/main">
+  <p:cSld>
+    <p:spTree>
+      <p:nvGrpSpPr>
+        <p:cNvPr id="1" name=""/>
+        <p:cNvGrpSpPr/>
+        <p:nvPr/>
+      </p:nvGrpSpPr>
+      <p:grpSpPr>
+        <a:xfrm>
+          <a:off x="0" y="0"/>
+          <a:ext cx="0" cy="0"/>
+          <a:chOff x="0" y="0"/>
+          <a:chExt cx="0" cy="0"/>
+        </a:xfrm>
+      </p:grpSpPr>
+      <p:sp>
+        <p:nvSpPr>
+          <p:cNvPr id="2" name="Slide Image Placeholder 1"/>
+          <p:cNvSpPr>
+            <a:spLocks noGrp="1" noRot="1" noChangeAspect="1"/>
+          </p:cNvSpPr>
+          <p:nvPr>
+            <p:ph type="sldImg"/>
+          </p:nvPr>
+        </p:nvSpPr>
+        <p:spPr>
+          <a:xfrm>
+            <a:off x="458788" y="720725"/>
+            <a:ext cx="6399212" cy="3600450"/>
+          </a:xfrm>
+        </p:spPr>
+      </p:sp>
+      <p:sp>
+        <p:nvSpPr>
+          <p:cNvPr id="3" name="Notes Placeholder 2"/>
+          <p:cNvSpPr>
+            <a:spLocks noGrp="1"/>
+          </p:cNvSpPr>
+          <p:nvPr>
+            <p:ph type="body" idx="1"/>
+          </p:nvPr>
+        </p:nvSpPr>
+        <p:spPr/>
+        <p:txBody>
+          <a:bodyPr/>
+          <a:lstStyle/>
+          <a:p>
+            <a:endParaRPr lang="en-US"/>
+          </a:p>
+        </p:txBody>
+      </p:sp>
+      <p:sp>
+        <p:nvSpPr>
+          <p:cNvPr id="4" name="Slide Number Placeholder 3"/>
+          <p:cNvSpPr>
+            <a:spLocks noGrp="1"/>
+          </p:cNvSpPr>
+          <p:nvPr>
+            <p:ph type="sldNum" sz="quarter" idx="10"/>
+          </p:nvPr>
+        </p:nvSpPr>
+        <p:spPr/>
+        <p:txBody>
+          <a:bodyPr/>
+          <a:lstStyle/>
+          <a:p>
+            <a:fld id="{E772BBEE-0ED0-4AF6-8D22-ECE7454DC3FC}" type="slidenum">
+              <a:rPr lang="en-US" smtClean="0"/>
+              <a:pPr/>
+              <a:t>9</a:t>
+            </a:fld>
+            <a:endParaRPr lang="en-US"/>
+          </a:p>
+        </p:txBody>
+      </p:sp>
+    </p:spTree>
+    <p:extLst>
+      <p:ext uri="{BB962C8B-B14F-4D97-AF65-F5344CB8AC3E}">
+        <p14:creationId xmlns:p14="http://schemas.microsoft.com/office/powerpoint/2010/main" val="350237693"/>
       </p:ext>
     </p:extLst>
   </p:cSld>
@@ -2246,10 +2177,47 @@
         </p:nvSpPr>
         <p:spPr/>
         <p:txBody>
-          <a:bodyPr/>
+          <a:bodyPr>
+            <a:normAutofit/>
+          </a:bodyPr>
           <a:lstStyle/>
           <a:p>
-            <a:endParaRPr lang="en-US"/>
+            <a:r>
+              <a:rPr lang="en-US" dirty="0"/>
+              <a:t>One thing lambda says is </a:t>
+            </a:r>
+          </a:p>
+          <a:p>
+            <a:r>
+              <a:rPr lang="en-US" dirty="0"/>
+              <a:t>"remember and parameterize this code, but don't execute it now."</a:t>
+            </a:r>
+          </a:p>
+          <a:p>
+            <a:r>
+              <a:rPr lang="en-US" dirty="0"/>
+              <a:t>Evaluation</a:t>
+            </a:r>
+            <a:r>
+              <a:rPr lang="en-US" baseline="0" dirty="0"/>
+              <a:t> a lambda expression NEVER causes its body to be evaluated.</a:t>
+            </a:r>
+          </a:p>
+          <a:p>
+            <a:endParaRPr lang="en-US" baseline="0" dirty="0"/>
+          </a:p>
+          <a:p>
+            <a:r>
+              <a:rPr lang="en-US" baseline="0" dirty="0"/>
+              <a:t>Ask students about the order of evaluation …in scheme, java</a:t>
+            </a:r>
+          </a:p>
+          <a:p>
+            <a:r>
+              <a:rPr lang="en-US" baseline="0" dirty="0"/>
+              <a:t>In racket scheme the order is left to right.  Other variants of scheme do not impose this constraint.</a:t>
+            </a:r>
+            <a:endParaRPr lang="en-US" dirty="0"/>
           </a:p>
         </p:txBody>
       </p:sp>
@@ -2280,7 +2248,7 @@
     </p:spTree>
     <p:extLst>
       <p:ext uri="{BB962C8B-B14F-4D97-AF65-F5344CB8AC3E}">
-        <p14:creationId xmlns:p14="http://schemas.microsoft.com/office/powerpoint/2010/main" val="350237693"/>
+        <p14:creationId xmlns:p14="http://schemas.microsoft.com/office/powerpoint/2010/main" val="3896124404"/>
       </p:ext>
     </p:extLst>
   </p:cSld>
@@ -17122,125 +17090,6 @@
 </file>
 
 <file path=ppt/slides/slide10.xml><?xml version="1.0" encoding="utf-8"?>
-<p:sld xmlns:a="http://schemas.openxmlformats.org/drawingml/2006/main" xmlns:r="http://schemas.openxmlformats.org/officeDocument/2006/relationships" xmlns:p="http://schemas.openxmlformats.org/presentationml/2006/main">
-  <p:cSld>
-    <p:spTree>
-      <p:nvGrpSpPr>
-        <p:cNvPr id="1" name=""/>
-        <p:cNvGrpSpPr/>
-        <p:nvPr/>
-      </p:nvGrpSpPr>
-      <p:grpSpPr>
-        <a:xfrm>
-          <a:off x="0" y="0"/>
-          <a:ext cx="0" cy="0"/>
-          <a:chOff x="0" y="0"/>
-          <a:chExt cx="0" cy="0"/>
-        </a:xfrm>
-      </p:grpSpPr>
-      <p:sp>
-        <p:nvSpPr>
-          <p:cNvPr id="327682" name="Rectangle 2"/>
-          <p:cNvSpPr>
-            <a:spLocks noGrp="1" noChangeArrowheads="1"/>
-          </p:cNvSpPr>
-          <p:nvPr>
-            <p:ph type="title"/>
-          </p:nvPr>
-        </p:nvSpPr>
-        <p:spPr/>
-        <p:txBody>
-          <a:bodyPr/>
-          <a:lstStyle/>
-          <a:p>
-            <a:r>
-              <a:rPr lang="en-US" dirty="0"/>
-              <a:t>Recap - Predicates</a:t>
-            </a:r>
-          </a:p>
-        </p:txBody>
-      </p:sp>
-      <p:sp>
-        <p:nvSpPr>
-          <p:cNvPr id="327683" name="Rectangle 3"/>
-          <p:cNvSpPr>
-            <a:spLocks noGrp="1" noChangeArrowheads="1"/>
-          </p:cNvSpPr>
-          <p:nvPr>
-            <p:ph type="body" idx="1"/>
-          </p:nvPr>
-        </p:nvSpPr>
-        <p:spPr>
-          <a:xfrm>
-            <a:off x="1981200" y="1371600"/>
-            <a:ext cx="8229600" cy="5257800"/>
-          </a:xfrm>
-        </p:spPr>
-        <p:txBody>
-          <a:bodyPr/>
-          <a:lstStyle/>
-          <a:p>
-            <a:r>
-              <a:rPr lang="en-US" sz="2800" dirty="0"/>
-              <a:t>What's a predicate?</a:t>
-            </a:r>
-          </a:p>
-          <a:p>
-            <a:r>
-              <a:rPr lang="en-US" sz="2800" b="1" dirty="0">
-                <a:solidFill>
-                  <a:srgbClr val="FFFF00"/>
-                </a:solidFill>
-              </a:rPr>
-              <a:t>How can you usually recognize that a given procedure is a predicate?</a:t>
-            </a:r>
-          </a:p>
-          <a:p>
-            <a:r>
-              <a:rPr lang="en-US" sz="2800" b="1" dirty="0"/>
-              <a:t>eq?</a:t>
-            </a:r>
-            <a:r>
-              <a:rPr lang="en-US" sz="2800" dirty="0"/>
-              <a:t> – very cheap equality, which has some edge cases with certain special characters and numbers (fractions, weird IEEE floating point numbers)</a:t>
-            </a:r>
-          </a:p>
-          <a:p>
-            <a:r>
-              <a:rPr lang="en-US" sz="2800" b="1" dirty="0" err="1"/>
-              <a:t>eqv</a:t>
-            </a:r>
-            <a:r>
-              <a:rPr lang="en-US" sz="2800" b="1" dirty="0"/>
-              <a:t>?</a:t>
-            </a:r>
-            <a:r>
-              <a:rPr lang="en-US" sz="2800" dirty="0"/>
-              <a:t> – fix the edge cases, but still pretty cheap</a:t>
-            </a:r>
-          </a:p>
-          <a:p>
-            <a:r>
-              <a:rPr lang="en-US" sz="2800" b="1" dirty="0"/>
-              <a:t>equal? – </a:t>
-            </a:r>
-            <a:r>
-              <a:rPr lang="en-US" sz="2800" dirty="0"/>
-              <a:t>compare the internals of strings and structures</a:t>
-            </a:r>
-            <a:endParaRPr lang="en-US" sz="2400" b="1" dirty="0"/>
-          </a:p>
-        </p:txBody>
-      </p:sp>
-    </p:spTree>
-  </p:cSld>
-  <p:clrMapOvr>
-    <a:masterClrMapping/>
-  </p:clrMapOvr>
-</p:sld>
-</file>
-
-<file path=ppt/slides/slide11.xml><?xml version="1.0" encoding="utf-8"?>
 <p:sld xmlns:a="http://schemas.openxmlformats.org/drawingml/2006/main" xmlns:r="http://schemas.openxmlformats.org/officeDocument/2006/relationships" xmlns:p="http://schemas.openxmlformats.org/presentationml/2006/main" showMasterPhAnim="0">
   <p:cSld>
     <p:spTree>
@@ -18044,7 +17893,7 @@
 </p:sld>
 </file>
 
-<file path=ppt/slides/slide12.xml><?xml version="1.0" encoding="utf-8"?>
+<file path=ppt/slides/slide11.xml><?xml version="1.0" encoding="utf-8"?>
 <p:sld xmlns:a="http://schemas.openxmlformats.org/drawingml/2006/main" xmlns:r="http://schemas.openxmlformats.org/officeDocument/2006/relationships" xmlns:p="http://schemas.openxmlformats.org/presentationml/2006/main">
   <p:cSld>
     <p:spTree>
@@ -18110,12 +17959,20 @@
             <p:ph idx="1"/>
           </p:nvPr>
         </p:nvSpPr>
-        <p:spPr/>
+        <p:spPr>
+          <a:xfrm>
+            <a:off x="609600" y="4059238"/>
+            <a:ext cx="10972800" cy="2189162"/>
+          </a:xfrm>
+        </p:spPr>
         <p:txBody>
           <a:bodyPr/>
           <a:lstStyle/>
           <a:p>
-            <a:endParaRPr lang="en-US" dirty="0"/>
+            <a:r>
+              <a:rPr lang="en-US" dirty="0"/>
+              <a:t>Thinking through the problem clearly is 90% of the battle.  Many of our in problems have pretty elegant solutions – but its OK to hop into the weeds as long as you are sure you are correct.</a:t>
+            </a:r>
           </a:p>
         </p:txBody>
       </p:sp>
@@ -18149,66 +18006,6 @@
           </a:prstGeom>
         </p:spPr>
       </p:pic>
-      <p:pic>
-        <p:nvPicPr>
-          <p:cNvPr id="5" name="Picture 4">
-            <a:extLst>
-              <a:ext uri="{FF2B5EF4-FFF2-40B4-BE49-F238E27FC236}">
-                <a16:creationId xmlns:a16="http://schemas.microsoft.com/office/drawing/2014/main" id="{86A2EA81-3FB2-41AC-8F67-07AC857FB3AB}"/>
-              </a:ext>
-            </a:extLst>
-          </p:cNvPr>
-          <p:cNvPicPr>
-            <a:picLocks noChangeAspect="1"/>
-          </p:cNvPicPr>
-          <p:nvPr/>
-        </p:nvPicPr>
-        <p:blipFill>
-          <a:blip r:embed="rId3"/>
-          <a:stretch>
-            <a:fillRect/>
-          </a:stretch>
-        </p:blipFill>
-        <p:spPr>
-          <a:xfrm>
-            <a:off x="2895600" y="3513304"/>
-            <a:ext cx="5859654" cy="1397094"/>
-          </a:xfrm>
-          <a:prstGeom prst="rect">
-            <a:avLst/>
-          </a:prstGeom>
-        </p:spPr>
-      </p:pic>
-      <p:pic>
-        <p:nvPicPr>
-          <p:cNvPr id="6" name="Picture 5">
-            <a:extLst>
-              <a:ext uri="{FF2B5EF4-FFF2-40B4-BE49-F238E27FC236}">
-                <a16:creationId xmlns:a16="http://schemas.microsoft.com/office/drawing/2014/main" id="{FA45F0C0-A81E-4BD7-BE35-F039DB6FA031}"/>
-              </a:ext>
-            </a:extLst>
-          </p:cNvPr>
-          <p:cNvPicPr>
-            <a:picLocks noChangeAspect="1"/>
-          </p:cNvPicPr>
-          <p:nvPr/>
-        </p:nvPicPr>
-        <p:blipFill>
-          <a:blip r:embed="rId4"/>
-          <a:stretch>
-            <a:fillRect/>
-          </a:stretch>
-        </p:blipFill>
-        <p:spPr>
-          <a:xfrm>
-            <a:off x="1546412" y="5085043"/>
-            <a:ext cx="8969188" cy="1481398"/>
-          </a:xfrm>
-          <a:prstGeom prst="rect">
-            <a:avLst/>
-          </a:prstGeom>
-        </p:spPr>
-      </p:pic>
     </p:spTree>
     <p:extLst>
       <p:ext uri="{BB962C8B-B14F-4D97-AF65-F5344CB8AC3E}">
@@ -18222,7 +18019,7 @@
 </p:sld>
 </file>
 
-<file path=ppt/slides/slide13.xml><?xml version="1.0" encoding="utf-8"?>
+<file path=ppt/slides/slide12.xml><?xml version="1.0" encoding="utf-8"?>
 <p:sld xmlns:a="http://schemas.openxmlformats.org/drawingml/2006/main" xmlns:r="http://schemas.openxmlformats.org/officeDocument/2006/relationships" xmlns:p="http://schemas.openxmlformats.org/presentationml/2006/main">
   <p:cSld>
     <p:spTree>
@@ -18821,11 +18618,14 @@
         </p:nvSpPr>
         <p:spPr bwMode="auto">
           <a:xfrm>
-            <a:off x="1828800" y="5334000"/>
-            <a:ext cx="4419600" cy="1143000"/>
+            <a:off x="1828800" y="5218893"/>
+            <a:ext cx="4419600" cy="1600200"/>
           </a:xfrm>
           <a:prstGeom prst="wave">
-            <a:avLst/>
+            <a:avLst>
+              <a:gd name="adj1" fmla="val 12500"/>
+              <a:gd name="adj2" fmla="val 164"/>
+            </a:avLst>
           </a:prstGeom>
           <a:solidFill>
             <a:schemeClr val="accent2">
@@ -18854,6 +18654,16 @@
           <a:p>
             <a:pPr algn="ctr"/>
             <a:r>
+              <a:rPr lang="en-US" sz="2000" dirty="0" err="1">
+                <a:solidFill>
+                  <a:schemeClr val="tx2">
+                    <a:lumMod val="25000"/>
+                  </a:schemeClr>
+                </a:solidFill>
+              </a:rPr>
+              <a:t>DrRacket</a:t>
+            </a:r>
+            <a:r>
               <a:rPr lang="en-US" sz="2000" dirty="0">
                 <a:solidFill>
                   <a:schemeClr val="tx2">
@@ -18861,7 +18671,7 @@
                   </a:schemeClr>
                 </a:solidFill>
               </a:rPr>
-              <a:t>Escape from infinite loop by repeatedly pressing ctrl-c</a:t>
+              <a:t> is not amazing at infinite loops.  Save before you run!</a:t>
             </a:r>
           </a:p>
         </p:txBody>
@@ -18879,7 +18689,7 @@
 </p:sld>
 </file>
 
-<file path=ppt/slides/slide14.xml><?xml version="1.0" encoding="utf-8"?>
+<file path=ppt/slides/slide13.xml><?xml version="1.0" encoding="utf-8"?>
 <p:sld xmlns:a="http://schemas.openxmlformats.org/drawingml/2006/main" xmlns:r="http://schemas.openxmlformats.org/officeDocument/2006/relationships" xmlns:p="http://schemas.openxmlformats.org/presentationml/2006/main">
   <p:cSld>
     <p:spTree>
@@ -19452,7 +19262,7 @@
 </p:sld>
 </file>
 
-<file path=ppt/slides/slide15.xml><?xml version="1.0" encoding="utf-8"?>
+<file path=ppt/slides/slide14.xml><?xml version="1.0" encoding="utf-8"?>
 <p:sld xmlns:a="http://schemas.openxmlformats.org/drawingml/2006/main" xmlns:r="http://schemas.openxmlformats.org/officeDocument/2006/relationships" xmlns:p="http://schemas.openxmlformats.org/presentationml/2006/main">
   <p:cSld>
     <p:spTree>
@@ -20583,402 +20393,6 @@
       </p:grpSpPr>
       <p:sp>
         <p:nvSpPr>
-          <p:cNvPr id="337922" name="Rectangle 2"/>
-          <p:cNvSpPr>
-            <a:spLocks noGrp="1" noChangeArrowheads="1"/>
-          </p:cNvSpPr>
-          <p:nvPr>
-            <p:ph type="title"/>
-          </p:nvPr>
-        </p:nvSpPr>
-        <p:spPr>
-          <a:xfrm>
-            <a:off x="2286000" y="0"/>
-            <a:ext cx="7772400" cy="838200"/>
-          </a:xfrm>
-        </p:spPr>
-        <p:txBody>
-          <a:bodyPr/>
-          <a:lstStyle/>
-          <a:p>
-            <a:r>
-              <a:rPr lang="en-US" dirty="0"/>
-              <a:t>Why Scheme for CSSE304?</a:t>
-            </a:r>
-          </a:p>
-        </p:txBody>
-      </p:sp>
-      <p:sp>
-        <p:nvSpPr>
-          <p:cNvPr id="337923" name="Rectangle 3"/>
-          <p:cNvSpPr>
-            <a:spLocks noGrp="1" noChangeArrowheads="1"/>
-          </p:cNvSpPr>
-          <p:nvPr>
-            <p:ph type="body" idx="1"/>
-          </p:nvPr>
-        </p:nvSpPr>
-        <p:spPr>
-          <a:xfrm>
-            <a:off x="1524000" y="838200"/>
-            <a:ext cx="8991600" cy="5867400"/>
-          </a:xfrm>
-        </p:spPr>
-        <p:txBody>
-          <a:bodyPr/>
-          <a:lstStyle/>
-          <a:p>
-            <a:pPr marL="609600" indent="-609600">
-              <a:lnSpc>
-                <a:spcPct val="90000"/>
-              </a:lnSpc>
-            </a:pPr>
-            <a:r>
-              <a:rPr lang="en-US" sz="3000" dirty="0"/>
-              <a:t>In PLC, Scheme is not an end in itself. </a:t>
-            </a:r>
-          </a:p>
-          <a:p>
-            <a:pPr marL="609600" indent="-609600">
-              <a:lnSpc>
-                <a:spcPct val="90000"/>
-              </a:lnSpc>
-            </a:pPr>
-            <a:r>
-              <a:rPr lang="en-US" sz="3000" b="1" dirty="0">
-                <a:solidFill>
-                  <a:srgbClr val="FFFF00"/>
-                </a:solidFill>
-              </a:rPr>
-              <a:t>Scheme will serve two purposes </a:t>
-            </a:r>
-            <a:br>
-              <a:rPr lang="en-US" sz="3000" b="1" dirty="0">
-                <a:solidFill>
-                  <a:srgbClr val="FFFF00"/>
-                </a:solidFill>
-              </a:rPr>
-            </a:br>
-            <a:r>
-              <a:rPr lang="en-US" sz="3000" b="1" dirty="0">
-                <a:solidFill>
-                  <a:srgbClr val="FFFF00"/>
-                </a:solidFill>
-              </a:rPr>
-              <a:t>in this course:</a:t>
-            </a:r>
-          </a:p>
-          <a:p>
-            <a:pPr marL="1009650" lvl="1" indent="-609600">
-              <a:lnSpc>
-                <a:spcPct val="90000"/>
-              </a:lnSpc>
-              <a:spcAft>
-                <a:spcPts val="1800"/>
-              </a:spcAft>
-              <a:buFontTx/>
-              <a:buAutoNum type="arabicPeriod"/>
-            </a:pPr>
-            <a:r>
-              <a:rPr lang="en-US" sz="2600" dirty="0"/>
-              <a:t>A place to see new programming concepts without having to learn syntax of lots of languages.</a:t>
-            </a:r>
-          </a:p>
-          <a:p>
-            <a:pPr marL="1009650" lvl="1" indent="-609600">
-              <a:lnSpc>
-                <a:spcPct val="90000"/>
-              </a:lnSpc>
-              <a:buFontTx/>
-              <a:buAutoNum type="arabicPeriod"/>
-            </a:pPr>
-            <a:r>
-              <a:rPr lang="en-US" sz="2600" dirty="0"/>
-              <a:t>A laboratory environment in which to better understand PL concepts by implementing them in our own interpreters.</a:t>
-            </a:r>
-          </a:p>
-          <a:p>
-            <a:pPr marL="609600" indent="-609600">
-              <a:lnSpc>
-                <a:spcPct val="90000"/>
-              </a:lnSpc>
-            </a:pPr>
-            <a:r>
-              <a:rPr lang="en-US" sz="2800" dirty="0"/>
-              <a:t>After a steep initial language learning curve, the overhead cost of introducing each new programming concept or paradigm in Scheme is low. </a:t>
-            </a:r>
-          </a:p>
-        </p:txBody>
-      </p:sp>
-    </p:spTree>
-  </p:cSld>
-  <p:clrMapOvr>
-    <a:masterClrMapping/>
-  </p:clrMapOvr>
-  <p:timing>
-    <p:tnLst>
-      <p:par>
-        <p:cTn id="1" dur="indefinite" restart="never" nodeType="tmRoot">
-          <p:childTnLst>
-            <p:seq concurrent="1" nextAc="seek">
-              <p:cTn id="2" dur="indefinite" nodeType="mainSeq">
-                <p:childTnLst>
-                  <p:par>
-                    <p:cTn id="3" fill="hold">
-                      <p:stCondLst>
-                        <p:cond delay="indefinite"/>
-                      </p:stCondLst>
-                      <p:childTnLst>
-                        <p:par>
-                          <p:cTn id="4" fill="hold">
-                            <p:stCondLst>
-                              <p:cond delay="0"/>
-                            </p:stCondLst>
-                            <p:childTnLst>
-                              <p:par>
-                                <p:cTn id="5" presetID="1" presetClass="entr" presetSubtype="0" fill="hold" grpId="0" nodeType="clickEffect">
-                                  <p:stCondLst>
-                                    <p:cond delay="0"/>
-                                  </p:stCondLst>
-                                  <p:childTnLst>
-                                    <p:set>
-                                      <p:cBhvr>
-                                        <p:cTn id="6" dur="1" fill="hold">
-                                          <p:stCondLst>
-                                            <p:cond delay="0"/>
-                                          </p:stCondLst>
-                                        </p:cTn>
-                                        <p:tgtEl>
-                                          <p:spTgt spid="337923">
-                                            <p:txEl>
-                                              <p:pRg st="0" end="0"/>
-                                            </p:txEl>
-                                          </p:spTgt>
-                                        </p:tgtEl>
-                                        <p:attrNameLst>
-                                          <p:attrName>style.visibility</p:attrName>
-                                        </p:attrNameLst>
-                                      </p:cBhvr>
-                                      <p:to>
-                                        <p:strVal val="visible"/>
-                                      </p:to>
-                                    </p:set>
-                                  </p:childTnLst>
-                                </p:cTn>
-                              </p:par>
-                            </p:childTnLst>
-                          </p:cTn>
-                        </p:par>
-                      </p:childTnLst>
-                    </p:cTn>
-                  </p:par>
-                  <p:par>
-                    <p:cTn id="7" fill="hold">
-                      <p:stCondLst>
-                        <p:cond delay="indefinite"/>
-                      </p:stCondLst>
-                      <p:childTnLst>
-                        <p:par>
-                          <p:cTn id="8" fill="hold">
-                            <p:stCondLst>
-                              <p:cond delay="0"/>
-                            </p:stCondLst>
-                            <p:childTnLst>
-                              <p:par>
-                                <p:cTn id="9" presetID="1" presetClass="entr" presetSubtype="0" fill="hold" grpId="0" nodeType="clickEffect">
-                                  <p:stCondLst>
-                                    <p:cond delay="0"/>
-                                  </p:stCondLst>
-                                  <p:childTnLst>
-                                    <p:set>
-                                      <p:cBhvr>
-                                        <p:cTn id="10" dur="1" fill="hold">
-                                          <p:stCondLst>
-                                            <p:cond delay="0"/>
-                                          </p:stCondLst>
-                                        </p:cTn>
-                                        <p:tgtEl>
-                                          <p:spTgt spid="337923">
-                                            <p:txEl>
-                                              <p:pRg st="1" end="1"/>
-                                            </p:txEl>
-                                          </p:spTgt>
-                                        </p:tgtEl>
-                                        <p:attrNameLst>
-                                          <p:attrName>style.visibility</p:attrName>
-                                        </p:attrNameLst>
-                                      </p:cBhvr>
-                                      <p:to>
-                                        <p:strVal val="visible"/>
-                                      </p:to>
-                                    </p:set>
-                                  </p:childTnLst>
-                                </p:cTn>
-                              </p:par>
-                              <p:par>
-                                <p:cTn id="11" presetID="1" presetClass="entr" presetSubtype="0" fill="hold" grpId="0" nodeType="withEffect">
-                                  <p:stCondLst>
-                                    <p:cond delay="0"/>
-                                  </p:stCondLst>
-                                  <p:childTnLst>
-                                    <p:set>
-                                      <p:cBhvr>
-                                        <p:cTn id="12" dur="1" fill="hold">
-                                          <p:stCondLst>
-                                            <p:cond delay="0"/>
-                                          </p:stCondLst>
-                                        </p:cTn>
-                                        <p:tgtEl>
-                                          <p:spTgt spid="337923">
-                                            <p:txEl>
-                                              <p:pRg st="2" end="2"/>
-                                            </p:txEl>
-                                          </p:spTgt>
-                                        </p:tgtEl>
-                                        <p:attrNameLst>
-                                          <p:attrName>style.visibility</p:attrName>
-                                        </p:attrNameLst>
-                                      </p:cBhvr>
-                                      <p:to>
-                                        <p:strVal val="visible"/>
-                                      </p:to>
-                                    </p:set>
-                                  </p:childTnLst>
-                                </p:cTn>
-                              </p:par>
-                              <p:par>
-                                <p:cTn id="13" presetID="1" presetClass="entr" presetSubtype="0" fill="hold" grpId="0" nodeType="withEffect">
-                                  <p:stCondLst>
-                                    <p:cond delay="0"/>
-                                  </p:stCondLst>
-                                  <p:childTnLst>
-                                    <p:set>
-                                      <p:cBhvr>
-                                        <p:cTn id="14" dur="1" fill="hold">
-                                          <p:stCondLst>
-                                            <p:cond delay="0"/>
-                                          </p:stCondLst>
-                                        </p:cTn>
-                                        <p:tgtEl>
-                                          <p:spTgt spid="337923">
-                                            <p:txEl>
-                                              <p:pRg st="3" end="3"/>
-                                            </p:txEl>
-                                          </p:spTgt>
-                                        </p:tgtEl>
-                                        <p:attrNameLst>
-                                          <p:attrName>style.visibility</p:attrName>
-                                        </p:attrNameLst>
-                                      </p:cBhvr>
-                                      <p:to>
-                                        <p:strVal val="visible"/>
-                                      </p:to>
-                                    </p:set>
-                                  </p:childTnLst>
-                                </p:cTn>
-                              </p:par>
-                            </p:childTnLst>
-                          </p:cTn>
-                        </p:par>
-                      </p:childTnLst>
-                    </p:cTn>
-                  </p:par>
-                  <p:par>
-                    <p:cTn id="15" fill="hold">
-                      <p:stCondLst>
-                        <p:cond delay="indefinite"/>
-                      </p:stCondLst>
-                      <p:childTnLst>
-                        <p:par>
-                          <p:cTn id="16" fill="hold">
-                            <p:stCondLst>
-                              <p:cond delay="0"/>
-                            </p:stCondLst>
-                            <p:childTnLst>
-                              <p:par>
-                                <p:cTn id="17" presetID="1" presetClass="entr" presetSubtype="0" fill="hold" grpId="0" nodeType="clickEffect">
-                                  <p:stCondLst>
-                                    <p:cond delay="0"/>
-                                  </p:stCondLst>
-                                  <p:childTnLst>
-                                    <p:set>
-                                      <p:cBhvr>
-                                        <p:cTn id="18" dur="1" fill="hold">
-                                          <p:stCondLst>
-                                            <p:cond delay="0"/>
-                                          </p:stCondLst>
-                                        </p:cTn>
-                                        <p:tgtEl>
-                                          <p:spTgt spid="337923">
-                                            <p:txEl>
-                                              <p:pRg st="4" end="4"/>
-                                            </p:txEl>
-                                          </p:spTgt>
-                                        </p:tgtEl>
-                                        <p:attrNameLst>
-                                          <p:attrName>style.visibility</p:attrName>
-                                        </p:attrNameLst>
-                                      </p:cBhvr>
-                                      <p:to>
-                                        <p:strVal val="visible"/>
-                                      </p:to>
-                                    </p:set>
-                                  </p:childTnLst>
-                                </p:cTn>
-                              </p:par>
-                            </p:childTnLst>
-                          </p:cTn>
-                        </p:par>
-                      </p:childTnLst>
-                    </p:cTn>
-                  </p:par>
-                </p:childTnLst>
-              </p:cTn>
-              <p:prevCondLst>
-                <p:cond evt="onPrev" delay="0">
-                  <p:tgtEl>
-                    <p:sldTgt/>
-                  </p:tgtEl>
-                </p:cond>
-              </p:prevCondLst>
-              <p:nextCondLst>
-                <p:cond evt="onNext" delay="0">
-                  <p:tgtEl>
-                    <p:sldTgt/>
-                  </p:tgtEl>
-                </p:cond>
-              </p:nextCondLst>
-            </p:seq>
-          </p:childTnLst>
-        </p:cTn>
-      </p:par>
-    </p:tnLst>
-    <p:bldLst>
-      <p:bldP spid="337923" grpId="0" build="p"/>
-    </p:bldLst>
-  </p:timing>
-</p:sld>
-</file>
-
-<file path=ppt/slides/slide8.xml><?xml version="1.0" encoding="utf-8"?>
-<p:sld xmlns:a="http://schemas.openxmlformats.org/drawingml/2006/main" xmlns:r="http://schemas.openxmlformats.org/officeDocument/2006/relationships" xmlns:p="http://schemas.openxmlformats.org/presentationml/2006/main" showMasterPhAnim="0">
-  <p:cSld>
-    <p:spTree>
-      <p:nvGrpSpPr>
-        <p:cNvPr id="1" name=""/>
-        <p:cNvGrpSpPr/>
-        <p:nvPr/>
-      </p:nvGrpSpPr>
-      <p:grpSpPr>
-        <a:xfrm>
-          <a:off x="0" y="0"/>
-          <a:ext cx="0" cy="0"/>
-          <a:chOff x="0" y="0"/>
-          <a:chExt cx="0" cy="0"/>
-        </a:xfrm>
-      </p:grpSpPr>
-      <p:sp>
-        <p:nvSpPr>
           <p:cNvPr id="340994" name="Rectangle 2"/>
           <p:cNvSpPr>
             <a:spLocks noGrp="1" noChangeArrowheads="1"/>
@@ -21166,7 +20580,7 @@
 </p:sld>
 </file>
 
-<file path=ppt/slides/slide9.xml><?xml version="1.0" encoding="utf-8"?>
+<file path=ppt/slides/slide8.xml><?xml version="1.0" encoding="utf-8"?>
 <p:sld xmlns:a="http://schemas.openxmlformats.org/drawingml/2006/main" xmlns:r="http://schemas.openxmlformats.org/officeDocument/2006/relationships" xmlns:p="http://schemas.openxmlformats.org/presentationml/2006/main" showMasterPhAnim="0">
   <p:cSld>
     <p:spTree>
@@ -21600,6 +21014,125 @@
       <p:bldP spid="345091" grpId="0" uiExpand="1" build="p"/>
     </p:bldLst>
   </p:timing>
+</p:sld>
+</file>
+
+<file path=ppt/slides/slide9.xml><?xml version="1.0" encoding="utf-8"?>
+<p:sld xmlns:a="http://schemas.openxmlformats.org/drawingml/2006/main" xmlns:r="http://schemas.openxmlformats.org/officeDocument/2006/relationships" xmlns:p="http://schemas.openxmlformats.org/presentationml/2006/main">
+  <p:cSld>
+    <p:spTree>
+      <p:nvGrpSpPr>
+        <p:cNvPr id="1" name=""/>
+        <p:cNvGrpSpPr/>
+        <p:nvPr/>
+      </p:nvGrpSpPr>
+      <p:grpSpPr>
+        <a:xfrm>
+          <a:off x="0" y="0"/>
+          <a:ext cx="0" cy="0"/>
+          <a:chOff x="0" y="0"/>
+          <a:chExt cx="0" cy="0"/>
+        </a:xfrm>
+      </p:grpSpPr>
+      <p:sp>
+        <p:nvSpPr>
+          <p:cNvPr id="327682" name="Rectangle 2"/>
+          <p:cNvSpPr>
+            <a:spLocks noGrp="1" noChangeArrowheads="1"/>
+          </p:cNvSpPr>
+          <p:nvPr>
+            <p:ph type="title"/>
+          </p:nvPr>
+        </p:nvSpPr>
+        <p:spPr/>
+        <p:txBody>
+          <a:bodyPr/>
+          <a:lstStyle/>
+          <a:p>
+            <a:r>
+              <a:rPr lang="en-US" dirty="0"/>
+              <a:t>Predicates</a:t>
+            </a:r>
+          </a:p>
+        </p:txBody>
+      </p:sp>
+      <p:sp>
+        <p:nvSpPr>
+          <p:cNvPr id="327683" name="Rectangle 3"/>
+          <p:cNvSpPr>
+            <a:spLocks noGrp="1" noChangeArrowheads="1"/>
+          </p:cNvSpPr>
+          <p:nvPr>
+            <p:ph type="body" idx="1"/>
+          </p:nvPr>
+        </p:nvSpPr>
+        <p:spPr>
+          <a:xfrm>
+            <a:off x="1981200" y="1371600"/>
+            <a:ext cx="8229600" cy="5257800"/>
+          </a:xfrm>
+        </p:spPr>
+        <p:txBody>
+          <a:bodyPr/>
+          <a:lstStyle/>
+          <a:p>
+            <a:r>
+              <a:rPr lang="en-US" sz="2800" dirty="0"/>
+              <a:t>What's a predicate?</a:t>
+            </a:r>
+          </a:p>
+          <a:p>
+            <a:r>
+              <a:rPr lang="en-US" sz="2800" b="1" dirty="0">
+                <a:solidFill>
+                  <a:srgbClr val="FFFF00"/>
+                </a:solidFill>
+              </a:rPr>
+              <a:t>How can you usually recognize that a given procedure is a predicate?</a:t>
+            </a:r>
+          </a:p>
+          <a:p>
+            <a:r>
+              <a:rPr lang="en-US" sz="2800" b="1" dirty="0"/>
+              <a:t>eq?</a:t>
+            </a:r>
+            <a:r>
+              <a:rPr lang="en-US" sz="2800" dirty="0"/>
+              <a:t> – very cheap equality, which has some edge cases with certain special characters and numbers (fractions, weird IEEE floating point numbers)</a:t>
+            </a:r>
+          </a:p>
+          <a:p>
+            <a:r>
+              <a:rPr lang="en-US" sz="2800" b="1" dirty="0" err="1"/>
+              <a:t>eqv</a:t>
+            </a:r>
+            <a:r>
+              <a:rPr lang="en-US" sz="2800" b="1" dirty="0"/>
+              <a:t>?</a:t>
+            </a:r>
+            <a:r>
+              <a:rPr lang="en-US" sz="2800" dirty="0"/>
+              <a:t> – fix the edge cases, but still pretty cheap</a:t>
+            </a:r>
+          </a:p>
+          <a:p>
+            <a:r>
+              <a:rPr lang="en-US" sz="2800" b="1" dirty="0"/>
+              <a:t>equal? – </a:t>
+            </a:r>
+            <a:r>
+              <a:rPr lang="en-US" sz="2800" dirty="0"/>
+              <a:t>compare the internals of strings and structures</a:t>
+            </a:r>
+            <a:endParaRPr lang="en-US" sz="2400" b="1" dirty="0"/>
+          </a:p>
+        </p:txBody>
+      </p:sp>
+    </p:spTree>
+  </p:cSld>
+  <p:clrMapOvr>
+    <a:masterClrMapping/>
+  </p:clrMapOvr>
 </p:sld>
 </file>
 

</xml_diff>